<commit_message>
Components, Prefabs and Scripts
</commit_message>
<xml_diff>
--- a/ST_Unity_101_Part1.pptx
+++ b/ST_Unity_101_Part1.pptx
@@ -5,7 +5,7 @@
     <p:sldMasterId id="2147483648" r:id="rId1"/>
   </p:sldMasterIdLst>
   <p:notesMasterIdLst>
-    <p:notesMasterId r:id="rId7"/>
+    <p:notesMasterId r:id="rId11"/>
   </p:notesMasterIdLst>
   <p:sldIdLst>
     <p:sldId id="256" r:id="rId2"/>
@@ -13,6 +13,10 @@
     <p:sldId id="258" r:id="rId4"/>
     <p:sldId id="259" r:id="rId5"/>
     <p:sldId id="260" r:id="rId6"/>
+    <p:sldId id="261" r:id="rId7"/>
+    <p:sldId id="264" r:id="rId8"/>
+    <p:sldId id="262" r:id="rId9"/>
+    <p:sldId id="263" r:id="rId10"/>
   </p:sldIdLst>
   <p:sldSz cx="12192000" cy="6858000"/>
   <p:notesSz cx="6858000" cy="9144000"/>
@@ -3585,10 +3589,7 @@
               <a:rPr lang="en-AU" dirty="0" err="1" smtClean="0"/>
               <a:t>UnityScript</a:t>
             </a:r>
-            <a:r>
-              <a:rPr lang="en-AU" dirty="0" smtClean="0"/>
-              <a:t> or Boo</a:t>
-            </a:r>
+            <a:endParaRPr lang="en-AU" dirty="0" smtClean="0"/>
           </a:p>
           <a:p>
             <a:r>
@@ -3757,11 +3758,7 @@
             <a:pPr lvl="1"/>
             <a:r>
               <a:rPr lang="en-AU" dirty="0" smtClean="0"/>
-              <a:t>Platform Licenses come in Basic and Pro </a:t>
-            </a:r>
-            <a:r>
-              <a:rPr lang="en-AU" dirty="0" smtClean="0"/>
-              <a:t>versions</a:t>
+              <a:t>Platform Licenses come in Basic and Pro versions</a:t>
             </a:r>
           </a:p>
           <a:p>
@@ -3770,7 +3767,6 @@
               <a:rPr lang="en-AU" dirty="0" smtClean="0"/>
               <a:t>Pro features require Pro licenses throughout</a:t>
             </a:r>
-            <a:endParaRPr lang="en-AU" dirty="0" smtClean="0"/>
           </a:p>
           <a:p>
             <a:pPr lvl="1"/>
@@ -3988,11 +3984,51 @@
           <a:p>
             <a:pPr lvl="1"/>
             <a:r>
-              <a:rPr lang="en-AU" smtClean="0"/>
-              <a:t>Logical objects</a:t>
-            </a:r>
-          </a:p>
-          <a:p>
+              <a:rPr lang="en-AU" dirty="0" smtClean="0"/>
+              <a:t>Logical </a:t>
+            </a:r>
+            <a:r>
+              <a:rPr lang="en-AU" dirty="0" smtClean="0"/>
+              <a:t>objects</a:t>
+            </a:r>
+          </a:p>
+          <a:p>
+            <a:r>
+              <a:rPr lang="en-AU" dirty="0" err="1" smtClean="0"/>
+              <a:t>GameObjects</a:t>
+            </a:r>
+            <a:r>
+              <a:rPr lang="en-AU" dirty="0"/>
+              <a:t> </a:t>
+            </a:r>
+            <a:r>
+              <a:rPr lang="en-AU" dirty="0" smtClean="0"/>
+              <a:t>only come with a Transform</a:t>
+            </a:r>
+          </a:p>
+          <a:p>
+            <a:r>
+              <a:rPr lang="en-AU" dirty="0" smtClean="0"/>
+              <a:t>Can be parented to create a Transform hierarchy</a:t>
+            </a:r>
+          </a:p>
+          <a:p>
+            <a:pPr lvl="1"/>
+            <a:r>
+              <a:rPr lang="en-AU" dirty="0" smtClean="0"/>
+              <a:t>Move parent and every child moves relative to parent</a:t>
+            </a:r>
+            <a:endParaRPr lang="en-AU" dirty="0" smtClean="0"/>
+          </a:p>
+          <a:p>
+            <a:r>
+              <a:rPr lang="en-AU" dirty="0" smtClean="0"/>
+              <a:t>Has Components, which defin</a:t>
+            </a:r>
+            <a:r>
+              <a:rPr lang="en-AU" dirty="0" smtClean="0"/>
+              <a:t>e the object</a:t>
+            </a:r>
             <a:endParaRPr lang="en-AU" dirty="0"/>
           </a:p>
         </p:txBody>
@@ -4001,6 +4037,429 @@
     <p:extLst>
       <p:ext uri="{BB962C8B-B14F-4D97-AF65-F5344CB8AC3E}">
         <p14:creationId xmlns:p14="http://schemas.microsoft.com/office/powerpoint/2010/main" val="1072914218"/>
+      </p:ext>
+    </p:extLst>
+  </p:cSld>
+  <p:clrMapOvr>
+    <a:masterClrMapping/>
+  </p:clrMapOvr>
+</p:sld>
+</file>
+
+<file path=ppt/slides/slide6.xml><?xml version="1.0" encoding="utf-8"?>
+<p:sld xmlns:a="http://schemas.openxmlformats.org/drawingml/2006/main" xmlns:r="http://schemas.openxmlformats.org/officeDocument/2006/relationships" xmlns:p="http://schemas.openxmlformats.org/presentationml/2006/main">
+  <p:cSld>
+    <p:spTree>
+      <p:nvGrpSpPr>
+        <p:cNvPr id="1" name=""/>
+        <p:cNvGrpSpPr/>
+        <p:nvPr/>
+      </p:nvGrpSpPr>
+      <p:grpSpPr>
+        <a:xfrm>
+          <a:off x="0" y="0"/>
+          <a:ext cx="0" cy="0"/>
+          <a:chOff x="0" y="0"/>
+          <a:chExt cx="0" cy="0"/>
+        </a:xfrm>
+      </p:grpSpPr>
+      <p:sp>
+        <p:nvSpPr>
+          <p:cNvPr id="2" name="Title 1"/>
+          <p:cNvSpPr>
+            <a:spLocks noGrp="1"/>
+          </p:cNvSpPr>
+          <p:nvPr>
+            <p:ph type="title"/>
+          </p:nvPr>
+        </p:nvSpPr>
+        <p:spPr/>
+        <p:txBody>
+          <a:bodyPr/>
+          <a:lstStyle/>
+          <a:p>
+            <a:r>
+              <a:rPr lang="en-AU" dirty="0" smtClean="0"/>
+              <a:t>Components</a:t>
+            </a:r>
+            <a:endParaRPr lang="en-AU" dirty="0"/>
+          </a:p>
+        </p:txBody>
+      </p:sp>
+      <p:sp>
+        <p:nvSpPr>
+          <p:cNvPr id="3" name="Content Placeholder 2"/>
+          <p:cNvSpPr>
+            <a:spLocks noGrp="1"/>
+          </p:cNvSpPr>
+          <p:nvPr>
+            <p:ph idx="1"/>
+          </p:nvPr>
+        </p:nvSpPr>
+        <p:spPr/>
+        <p:txBody>
+          <a:bodyPr/>
+          <a:lstStyle/>
+          <a:p>
+            <a:r>
+              <a:rPr lang="en-AU" dirty="0" smtClean="0"/>
+              <a:t>Building blocks for </a:t>
+            </a:r>
+            <a:r>
+              <a:rPr lang="en-AU" dirty="0" err="1" smtClean="0"/>
+              <a:t>GameObjects</a:t>
+            </a:r>
+            <a:endParaRPr lang="en-AU" dirty="0" smtClean="0"/>
+          </a:p>
+          <a:p>
+            <a:r>
+              <a:rPr lang="en-AU" dirty="0" err="1" smtClean="0"/>
+              <a:t>AddComponent</a:t>
+            </a:r>
+            <a:r>
+              <a:rPr lang="en-AU" dirty="0" smtClean="0"/>
+              <a:t>&lt;&gt;</a:t>
+            </a:r>
+          </a:p>
+          <a:p>
+            <a:r>
+              <a:rPr lang="en-AU" dirty="0" err="1" smtClean="0"/>
+              <a:t>GetComponent</a:t>
+            </a:r>
+            <a:r>
+              <a:rPr lang="en-AU" dirty="0" smtClean="0"/>
+              <a:t>&lt;&gt;</a:t>
+            </a:r>
+          </a:p>
+          <a:p>
+            <a:r>
+              <a:rPr lang="en-AU" dirty="0" smtClean="0"/>
+              <a:t>Added in Editor</a:t>
+            </a:r>
+          </a:p>
+          <a:p>
+            <a:r>
+              <a:rPr lang="en-AU" dirty="0" smtClean="0"/>
+              <a:t>Scripts, Physics, Rendering, anything</a:t>
+            </a:r>
+            <a:endParaRPr lang="en-AU" dirty="0"/>
+          </a:p>
+        </p:txBody>
+      </p:sp>
+    </p:spTree>
+    <p:extLst>
+      <p:ext uri="{BB962C8B-B14F-4D97-AF65-F5344CB8AC3E}">
+        <p14:creationId xmlns:p14="http://schemas.microsoft.com/office/powerpoint/2010/main" val="3770468816"/>
+      </p:ext>
+    </p:extLst>
+  </p:cSld>
+  <p:clrMapOvr>
+    <a:masterClrMapping/>
+  </p:clrMapOvr>
+</p:sld>
+</file>
+
+<file path=ppt/slides/slide7.xml><?xml version="1.0" encoding="utf-8"?>
+<p:sld xmlns:a="http://schemas.openxmlformats.org/drawingml/2006/main" xmlns:r="http://schemas.openxmlformats.org/officeDocument/2006/relationships" xmlns:p="http://schemas.openxmlformats.org/presentationml/2006/main">
+  <p:cSld>
+    <p:spTree>
+      <p:nvGrpSpPr>
+        <p:cNvPr id="1" name=""/>
+        <p:cNvGrpSpPr/>
+        <p:nvPr/>
+      </p:nvGrpSpPr>
+      <p:grpSpPr>
+        <a:xfrm>
+          <a:off x="0" y="0"/>
+          <a:ext cx="0" cy="0"/>
+          <a:chOff x="0" y="0"/>
+          <a:chExt cx="0" cy="0"/>
+        </a:xfrm>
+      </p:grpSpPr>
+      <p:sp>
+        <p:nvSpPr>
+          <p:cNvPr id="2" name="Title 1"/>
+          <p:cNvSpPr>
+            <a:spLocks noGrp="1"/>
+          </p:cNvSpPr>
+          <p:nvPr>
+            <p:ph type="title"/>
+          </p:nvPr>
+        </p:nvSpPr>
+        <p:spPr/>
+        <p:txBody>
+          <a:bodyPr/>
+          <a:lstStyle/>
+          <a:p>
+            <a:r>
+              <a:rPr lang="en-AU" dirty="0" smtClean="0"/>
+              <a:t>Prefabs</a:t>
+            </a:r>
+            <a:endParaRPr lang="en-AU" dirty="0"/>
+          </a:p>
+        </p:txBody>
+      </p:sp>
+      <p:sp>
+        <p:nvSpPr>
+          <p:cNvPr id="3" name="Content Placeholder 2"/>
+          <p:cNvSpPr>
+            <a:spLocks noGrp="1"/>
+          </p:cNvSpPr>
+          <p:nvPr>
+            <p:ph idx="1"/>
+          </p:nvPr>
+        </p:nvSpPr>
+        <p:spPr/>
+        <p:txBody>
+          <a:bodyPr/>
+          <a:lstStyle/>
+          <a:p>
+            <a:r>
+              <a:rPr lang="en-AU" dirty="0" smtClean="0"/>
+              <a:t>Save </a:t>
+            </a:r>
+            <a:r>
+              <a:rPr lang="en-AU" dirty="0" err="1" smtClean="0"/>
+              <a:t>GameObjects</a:t>
+            </a:r>
+            <a:r>
+              <a:rPr lang="en-AU" dirty="0" smtClean="0"/>
+              <a:t> as templates for quick creation at Runtime</a:t>
+            </a:r>
+          </a:p>
+          <a:p>
+            <a:r>
+              <a:rPr lang="en-AU" dirty="0" smtClean="0"/>
+              <a:t>Re-use object designs</a:t>
+            </a:r>
+            <a:endParaRPr lang="en-AU" dirty="0"/>
+          </a:p>
+          <a:p>
+            <a:r>
+              <a:rPr lang="en-AU" dirty="0" smtClean="0"/>
+              <a:t>Drag object to Project view </a:t>
+            </a:r>
+            <a:r>
+              <a:rPr lang="en-AU" smtClean="0"/>
+              <a:t>to create</a:t>
+            </a:r>
+            <a:endParaRPr lang="en-AU" dirty="0" smtClean="0"/>
+          </a:p>
+        </p:txBody>
+      </p:sp>
+    </p:spTree>
+    <p:extLst>
+      <p:ext uri="{BB962C8B-B14F-4D97-AF65-F5344CB8AC3E}">
+        <p14:creationId xmlns:p14="http://schemas.microsoft.com/office/powerpoint/2010/main" val="346306987"/>
+      </p:ext>
+    </p:extLst>
+  </p:cSld>
+  <p:clrMapOvr>
+    <a:masterClrMapping/>
+  </p:clrMapOvr>
+</p:sld>
+</file>
+
+<file path=ppt/slides/slide8.xml><?xml version="1.0" encoding="utf-8"?>
+<p:sld xmlns:a="http://schemas.openxmlformats.org/drawingml/2006/main" xmlns:r="http://schemas.openxmlformats.org/officeDocument/2006/relationships" xmlns:p="http://schemas.openxmlformats.org/presentationml/2006/main">
+  <p:cSld>
+    <p:spTree>
+      <p:nvGrpSpPr>
+        <p:cNvPr id="1" name=""/>
+        <p:cNvGrpSpPr/>
+        <p:nvPr/>
+      </p:nvGrpSpPr>
+      <p:grpSpPr>
+        <a:xfrm>
+          <a:off x="0" y="0"/>
+          <a:ext cx="0" cy="0"/>
+          <a:chOff x="0" y="0"/>
+          <a:chExt cx="0" cy="0"/>
+        </a:xfrm>
+      </p:grpSpPr>
+      <p:sp>
+        <p:nvSpPr>
+          <p:cNvPr id="2" name="Title 1"/>
+          <p:cNvSpPr>
+            <a:spLocks noGrp="1"/>
+          </p:cNvSpPr>
+          <p:nvPr>
+            <p:ph type="title"/>
+          </p:nvPr>
+        </p:nvSpPr>
+        <p:spPr/>
+        <p:txBody>
+          <a:bodyPr/>
+          <a:lstStyle/>
+          <a:p>
+            <a:r>
+              <a:rPr lang="en-AU" dirty="0" smtClean="0"/>
+              <a:t>Scripting</a:t>
+            </a:r>
+            <a:endParaRPr lang="en-AU" dirty="0"/>
+          </a:p>
+        </p:txBody>
+      </p:sp>
+      <p:sp>
+        <p:nvSpPr>
+          <p:cNvPr id="3" name="Content Placeholder 2"/>
+          <p:cNvSpPr>
+            <a:spLocks noGrp="1"/>
+          </p:cNvSpPr>
+          <p:nvPr>
+            <p:ph idx="1"/>
+          </p:nvPr>
+        </p:nvSpPr>
+        <p:spPr/>
+        <p:txBody>
+          <a:bodyPr/>
+          <a:lstStyle/>
+          <a:p>
+            <a:r>
+              <a:rPr lang="en-AU" dirty="0" smtClean="0"/>
+              <a:t>C#, </a:t>
+            </a:r>
+            <a:r>
+              <a:rPr lang="en-AU" dirty="0" err="1" smtClean="0"/>
+              <a:t>UnityScript</a:t>
+            </a:r>
+            <a:endParaRPr lang="en-AU" dirty="0" smtClean="0"/>
+          </a:p>
+          <a:p>
+            <a:r>
+              <a:rPr lang="en-AU" dirty="0" smtClean="0"/>
+              <a:t>Classes that inherit from </a:t>
+            </a:r>
+            <a:r>
+              <a:rPr lang="en-AU" dirty="0" err="1" smtClean="0"/>
+              <a:t>MonoBehaviour</a:t>
+            </a:r>
+            <a:endParaRPr lang="en-AU" dirty="0" smtClean="0"/>
+          </a:p>
+          <a:p>
+            <a:pPr lvl="1"/>
+            <a:r>
+              <a:rPr lang="en-AU" dirty="0" smtClean="0"/>
+              <a:t>Can have other code, but these directly link to </a:t>
+            </a:r>
+            <a:r>
+              <a:rPr lang="en-AU" dirty="0" err="1" smtClean="0"/>
+              <a:t>GameObjects</a:t>
+            </a:r>
+            <a:r>
+              <a:rPr lang="en-AU" dirty="0" smtClean="0"/>
+              <a:t> as Components</a:t>
+            </a:r>
+          </a:p>
+          <a:p>
+            <a:r>
+              <a:rPr lang="en-AU" dirty="0" smtClean="0"/>
+              <a:t>Uses </a:t>
+            </a:r>
+            <a:r>
+              <a:rPr lang="en-AU" dirty="0" err="1" smtClean="0"/>
+              <a:t>MonoDevelop</a:t>
+            </a:r>
+            <a:r>
+              <a:rPr lang="en-AU" dirty="0" smtClean="0"/>
+              <a:t> by default</a:t>
+            </a:r>
+          </a:p>
+          <a:p>
+            <a:r>
+              <a:rPr lang="en-AU" dirty="0" smtClean="0"/>
+              <a:t>Visual Studio if you don’t need debugging</a:t>
+            </a:r>
+          </a:p>
+          <a:p>
+            <a:pPr lvl="1"/>
+            <a:r>
+              <a:rPr lang="en-AU" dirty="0" err="1" smtClean="0"/>
+              <a:t>UnityVS</a:t>
+            </a:r>
+            <a:r>
+              <a:rPr lang="en-AU" dirty="0" smtClean="0"/>
+              <a:t> (paid plugin) fixes this</a:t>
+            </a:r>
+          </a:p>
+        </p:txBody>
+      </p:sp>
+    </p:spTree>
+    <p:extLst>
+      <p:ext uri="{BB962C8B-B14F-4D97-AF65-F5344CB8AC3E}">
+        <p14:creationId xmlns:p14="http://schemas.microsoft.com/office/powerpoint/2010/main" val="675922141"/>
+      </p:ext>
+    </p:extLst>
+  </p:cSld>
+  <p:clrMapOvr>
+    <a:masterClrMapping/>
+  </p:clrMapOvr>
+</p:sld>
+</file>
+
+<file path=ppt/slides/slide9.xml><?xml version="1.0" encoding="utf-8"?>
+<p:sld xmlns:a="http://schemas.openxmlformats.org/drawingml/2006/main" xmlns:r="http://schemas.openxmlformats.org/officeDocument/2006/relationships" xmlns:p="http://schemas.openxmlformats.org/presentationml/2006/main">
+  <p:cSld>
+    <p:spTree>
+      <p:nvGrpSpPr>
+        <p:cNvPr id="1" name=""/>
+        <p:cNvGrpSpPr/>
+        <p:nvPr/>
+      </p:nvGrpSpPr>
+      <p:grpSpPr>
+        <a:xfrm>
+          <a:off x="0" y="0"/>
+          <a:ext cx="0" cy="0"/>
+          <a:chOff x="0" y="0"/>
+          <a:chExt cx="0" cy="0"/>
+        </a:xfrm>
+      </p:grpSpPr>
+      <p:sp>
+        <p:nvSpPr>
+          <p:cNvPr id="2" name="Title 1"/>
+          <p:cNvSpPr>
+            <a:spLocks noGrp="1"/>
+          </p:cNvSpPr>
+          <p:nvPr>
+            <p:ph type="title"/>
+          </p:nvPr>
+        </p:nvSpPr>
+        <p:spPr/>
+        <p:txBody>
+          <a:bodyPr/>
+          <a:lstStyle/>
+          <a:p>
+            <a:r>
+              <a:rPr lang="en-AU" dirty="0" smtClean="0"/>
+              <a:t>Assets</a:t>
+            </a:r>
+            <a:endParaRPr lang="en-AU" dirty="0"/>
+          </a:p>
+        </p:txBody>
+      </p:sp>
+      <p:sp>
+        <p:nvSpPr>
+          <p:cNvPr id="3" name="Content Placeholder 2"/>
+          <p:cNvSpPr>
+            <a:spLocks noGrp="1"/>
+          </p:cNvSpPr>
+          <p:nvPr>
+            <p:ph idx="1"/>
+          </p:nvPr>
+        </p:nvSpPr>
+        <p:spPr/>
+        <p:txBody>
+          <a:bodyPr/>
+          <a:lstStyle/>
+          <a:p>
+            <a:endParaRPr lang="en-AU"/>
+          </a:p>
+        </p:txBody>
+      </p:sp>
+    </p:spTree>
+    <p:extLst>
+      <p:ext uri="{BB962C8B-B14F-4D97-AF65-F5344CB8AC3E}">
+        <p14:creationId xmlns:p14="http://schemas.microsoft.com/office/powerpoint/2010/main" val="1645592049"/>
       </p:ext>
     </p:extLst>
   </p:cSld>

</xml_diff>

<commit_message>
Added 3D rendering, input etc
</commit_message>
<xml_diff>
--- a/ST_Unity_101_Part1.pptx
+++ b/ST_Unity_101_Part1.pptx
@@ -5,7 +5,7 @@
     <p:sldMasterId id="2147483648" r:id="rId1"/>
   </p:sldMasterIdLst>
   <p:notesMasterIdLst>
-    <p:notesMasterId r:id="rId11"/>
+    <p:notesMasterId r:id="rId14"/>
   </p:notesMasterIdLst>
   <p:sldIdLst>
     <p:sldId id="256" r:id="rId2"/>
@@ -17,6 +17,9 @@
     <p:sldId id="264" r:id="rId8"/>
     <p:sldId id="262" r:id="rId9"/>
     <p:sldId id="263" r:id="rId10"/>
+    <p:sldId id="265" r:id="rId11"/>
+    <p:sldId id="266" r:id="rId12"/>
+    <p:sldId id="268" r:id="rId13"/>
   </p:sldIdLst>
   <p:sldSz cx="12192000" cy="6858000"/>
   <p:notesSz cx="6858000" cy="9144000"/>
@@ -205,7 +208,7 @@
           <a:p>
             <a:fld id="{A724FAEC-7584-44B3-B386-6ADB31723F26}" type="datetimeFigureOut">
               <a:rPr lang="en-AU" smtClean="0"/>
-              <a:t>12/03/2014</a:t>
+              <a:t>24/03/2014</a:t>
             </a:fld>
             <a:endParaRPr lang="en-AU"/>
           </a:p>
@@ -729,7 +732,7 @@
           <a:p>
             <a:fld id="{C33626A4-D0D9-4927-8F98-739B1D29D8AB}" type="datetimeFigureOut">
               <a:rPr lang="en-AU" smtClean="0"/>
-              <a:t>12/03/2014</a:t>
+              <a:t>24/03/2014</a:t>
             </a:fld>
             <a:endParaRPr lang="en-AU"/>
           </a:p>
@@ -899,7 +902,7 @@
           <a:p>
             <a:fld id="{C33626A4-D0D9-4927-8F98-739B1D29D8AB}" type="datetimeFigureOut">
               <a:rPr lang="en-AU" smtClean="0"/>
-              <a:t>12/03/2014</a:t>
+              <a:t>24/03/2014</a:t>
             </a:fld>
             <a:endParaRPr lang="en-AU"/>
           </a:p>
@@ -1079,7 +1082,7 @@
           <a:p>
             <a:fld id="{C33626A4-D0D9-4927-8F98-739B1D29D8AB}" type="datetimeFigureOut">
               <a:rPr lang="en-AU" smtClean="0"/>
-              <a:t>12/03/2014</a:t>
+              <a:t>24/03/2014</a:t>
             </a:fld>
             <a:endParaRPr lang="en-AU"/>
           </a:p>
@@ -1249,7 +1252,7 @@
           <a:p>
             <a:fld id="{C33626A4-D0D9-4927-8F98-739B1D29D8AB}" type="datetimeFigureOut">
               <a:rPr lang="en-AU" smtClean="0"/>
-              <a:t>12/03/2014</a:t>
+              <a:t>24/03/2014</a:t>
             </a:fld>
             <a:endParaRPr lang="en-AU"/>
           </a:p>
@@ -1495,7 +1498,7 @@
           <a:p>
             <a:fld id="{C33626A4-D0D9-4927-8F98-739B1D29D8AB}" type="datetimeFigureOut">
               <a:rPr lang="en-AU" smtClean="0"/>
-              <a:t>12/03/2014</a:t>
+              <a:t>24/03/2014</a:t>
             </a:fld>
             <a:endParaRPr lang="en-AU"/>
           </a:p>
@@ -1727,7 +1730,7 @@
           <a:p>
             <a:fld id="{C33626A4-D0D9-4927-8F98-739B1D29D8AB}" type="datetimeFigureOut">
               <a:rPr lang="en-AU" smtClean="0"/>
-              <a:t>12/03/2014</a:t>
+              <a:t>24/03/2014</a:t>
             </a:fld>
             <a:endParaRPr lang="en-AU"/>
           </a:p>
@@ -2094,7 +2097,7 @@
           <a:p>
             <a:fld id="{C33626A4-D0D9-4927-8F98-739B1D29D8AB}" type="datetimeFigureOut">
               <a:rPr lang="en-AU" smtClean="0"/>
-              <a:t>12/03/2014</a:t>
+              <a:t>24/03/2014</a:t>
             </a:fld>
             <a:endParaRPr lang="en-AU"/>
           </a:p>
@@ -2212,7 +2215,7 @@
           <a:p>
             <a:fld id="{C33626A4-D0D9-4927-8F98-739B1D29D8AB}" type="datetimeFigureOut">
               <a:rPr lang="en-AU" smtClean="0"/>
-              <a:t>12/03/2014</a:t>
+              <a:t>24/03/2014</a:t>
             </a:fld>
             <a:endParaRPr lang="en-AU"/>
           </a:p>
@@ -2307,7 +2310,7 @@
           <a:p>
             <a:fld id="{C33626A4-D0D9-4927-8F98-739B1D29D8AB}" type="datetimeFigureOut">
               <a:rPr lang="en-AU" smtClean="0"/>
-              <a:t>12/03/2014</a:t>
+              <a:t>24/03/2014</a:t>
             </a:fld>
             <a:endParaRPr lang="en-AU"/>
           </a:p>
@@ -2584,7 +2587,7 @@
           <a:p>
             <a:fld id="{C33626A4-D0D9-4927-8F98-739B1D29D8AB}" type="datetimeFigureOut">
               <a:rPr lang="en-AU" smtClean="0"/>
-              <a:t>12/03/2014</a:t>
+              <a:t>24/03/2014</a:t>
             </a:fld>
             <a:endParaRPr lang="en-AU"/>
           </a:p>
@@ -2837,7 +2840,7 @@
           <a:p>
             <a:fld id="{C33626A4-D0D9-4927-8F98-739B1D29D8AB}" type="datetimeFigureOut">
               <a:rPr lang="en-AU" smtClean="0"/>
-              <a:t>12/03/2014</a:t>
+              <a:t>24/03/2014</a:t>
             </a:fld>
             <a:endParaRPr lang="en-AU"/>
           </a:p>
@@ -3050,7 +3053,7 @@
           <a:p>
             <a:fld id="{C33626A4-D0D9-4927-8F98-739B1D29D8AB}" type="datetimeFigureOut">
               <a:rPr lang="en-AU" smtClean="0"/>
-              <a:t>12/03/2014</a:t>
+              <a:t>24/03/2014</a:t>
             </a:fld>
             <a:endParaRPr lang="en-AU"/>
           </a:p>
@@ -3514,6 +3517,326 @@
 </p:sld>
 </file>
 
+<file path=ppt/slides/slide10.xml><?xml version="1.0" encoding="utf-8"?>
+<p:sld xmlns:a="http://schemas.openxmlformats.org/drawingml/2006/main" xmlns:r="http://schemas.openxmlformats.org/officeDocument/2006/relationships" xmlns:p="http://schemas.openxmlformats.org/presentationml/2006/main">
+  <p:cSld>
+    <p:spTree>
+      <p:nvGrpSpPr>
+        <p:cNvPr id="1" name=""/>
+        <p:cNvGrpSpPr/>
+        <p:nvPr/>
+      </p:nvGrpSpPr>
+      <p:grpSpPr>
+        <a:xfrm>
+          <a:off x="0" y="0"/>
+          <a:ext cx="0" cy="0"/>
+          <a:chOff x="0" y="0"/>
+          <a:chExt cx="0" cy="0"/>
+        </a:xfrm>
+      </p:grpSpPr>
+      <p:sp>
+        <p:nvSpPr>
+          <p:cNvPr id="2" name="Title 1"/>
+          <p:cNvSpPr>
+            <a:spLocks noGrp="1"/>
+          </p:cNvSpPr>
+          <p:nvPr>
+            <p:ph type="title"/>
+          </p:nvPr>
+        </p:nvSpPr>
+        <p:spPr/>
+        <p:txBody>
+          <a:bodyPr/>
+          <a:lstStyle/>
+          <a:p>
+            <a:r>
+              <a:rPr lang="en-AU" dirty="0" smtClean="0"/>
+              <a:t>3D Rendering</a:t>
+            </a:r>
+            <a:endParaRPr lang="en-AU" dirty="0"/>
+          </a:p>
+        </p:txBody>
+      </p:sp>
+      <p:sp>
+        <p:nvSpPr>
+          <p:cNvPr id="3" name="Content Placeholder 2"/>
+          <p:cNvSpPr>
+            <a:spLocks noGrp="1"/>
+          </p:cNvSpPr>
+          <p:nvPr>
+            <p:ph idx="1"/>
+          </p:nvPr>
+        </p:nvSpPr>
+        <p:spPr/>
+        <p:txBody>
+          <a:bodyPr/>
+          <a:lstStyle/>
+          <a:p>
+            <a:r>
+              <a:rPr lang="en-AU" dirty="0" smtClean="0"/>
+              <a:t>Mesh Filter</a:t>
+            </a:r>
+          </a:p>
+          <a:p>
+            <a:pPr lvl="1"/>
+            <a:r>
+              <a:rPr lang="en-AU" dirty="0" smtClean="0"/>
+              <a:t>The Mesh Data</a:t>
+            </a:r>
+          </a:p>
+          <a:p>
+            <a:r>
+              <a:rPr lang="en-AU" dirty="0" smtClean="0"/>
+              <a:t>Material</a:t>
+            </a:r>
+          </a:p>
+          <a:p>
+            <a:pPr lvl="1"/>
+            <a:r>
+              <a:rPr lang="en-AU" dirty="0" smtClean="0"/>
+              <a:t>More on this in Part 2</a:t>
+            </a:r>
+          </a:p>
+          <a:p>
+            <a:r>
+              <a:rPr lang="en-AU" dirty="0" smtClean="0"/>
+              <a:t>Mesh Renderer</a:t>
+            </a:r>
+          </a:p>
+          <a:p>
+            <a:pPr lvl="1"/>
+            <a:r>
+              <a:rPr lang="en-AU" dirty="0" smtClean="0"/>
+              <a:t>Binds Filter + Material and Draws</a:t>
+            </a:r>
+          </a:p>
+          <a:p>
+            <a:r>
+              <a:rPr lang="en-AU" dirty="0" smtClean="0"/>
+              <a:t>Unity generates a prefab from an imported model</a:t>
+            </a:r>
+          </a:p>
+          <a:p>
+            <a:r>
+              <a:rPr lang="en-AU" dirty="0" smtClean="0"/>
+              <a:t>Animator</a:t>
+            </a:r>
+          </a:p>
+          <a:p>
+            <a:pPr lvl="1"/>
+            <a:r>
+              <a:rPr lang="en-AU" smtClean="0"/>
+              <a:t>Not covered</a:t>
+            </a:r>
+            <a:endParaRPr lang="en-AU" dirty="0" smtClean="0"/>
+          </a:p>
+          <a:p>
+            <a:endParaRPr lang="en-AU" dirty="0" smtClean="0"/>
+          </a:p>
+        </p:txBody>
+      </p:sp>
+    </p:spTree>
+    <p:extLst>
+      <p:ext uri="{BB962C8B-B14F-4D97-AF65-F5344CB8AC3E}">
+        <p14:creationId xmlns:p14="http://schemas.microsoft.com/office/powerpoint/2010/main" val="2580776966"/>
+      </p:ext>
+    </p:extLst>
+  </p:cSld>
+  <p:clrMapOvr>
+    <a:masterClrMapping/>
+  </p:clrMapOvr>
+</p:sld>
+</file>
+
+<file path=ppt/slides/slide11.xml><?xml version="1.0" encoding="utf-8"?>
+<p:sld xmlns:a="http://schemas.openxmlformats.org/drawingml/2006/main" xmlns:r="http://schemas.openxmlformats.org/officeDocument/2006/relationships" xmlns:p="http://schemas.openxmlformats.org/presentationml/2006/main">
+  <p:cSld>
+    <p:spTree>
+      <p:nvGrpSpPr>
+        <p:cNvPr id="1" name=""/>
+        <p:cNvGrpSpPr/>
+        <p:nvPr/>
+      </p:nvGrpSpPr>
+      <p:grpSpPr>
+        <a:xfrm>
+          <a:off x="0" y="0"/>
+          <a:ext cx="0" cy="0"/>
+          <a:chOff x="0" y="0"/>
+          <a:chExt cx="0" cy="0"/>
+        </a:xfrm>
+      </p:grpSpPr>
+      <p:sp>
+        <p:nvSpPr>
+          <p:cNvPr id="2" name="Title 1"/>
+          <p:cNvSpPr>
+            <a:spLocks noGrp="1"/>
+          </p:cNvSpPr>
+          <p:nvPr>
+            <p:ph type="title"/>
+          </p:nvPr>
+        </p:nvSpPr>
+        <p:spPr/>
+        <p:txBody>
+          <a:bodyPr/>
+          <a:lstStyle/>
+          <a:p>
+            <a:r>
+              <a:rPr lang="en-AU" dirty="0" smtClean="0"/>
+              <a:t>Input</a:t>
+            </a:r>
+            <a:endParaRPr lang="en-AU" dirty="0"/>
+          </a:p>
+        </p:txBody>
+      </p:sp>
+      <p:sp>
+        <p:nvSpPr>
+          <p:cNvPr id="3" name="Content Placeholder 2"/>
+          <p:cNvSpPr>
+            <a:spLocks noGrp="1"/>
+          </p:cNvSpPr>
+          <p:nvPr>
+            <p:ph idx="1"/>
+          </p:nvPr>
+        </p:nvSpPr>
+        <p:spPr/>
+        <p:txBody>
+          <a:bodyPr/>
+          <a:lstStyle/>
+          <a:p>
+            <a:r>
+              <a:rPr lang="en-AU" dirty="0" smtClean="0"/>
+              <a:t>Hardcoded</a:t>
+            </a:r>
+          </a:p>
+          <a:p>
+            <a:pPr lvl="1"/>
+            <a:r>
+              <a:rPr lang="en-AU" dirty="0" smtClean="0"/>
+              <a:t>Check individual keys in code</a:t>
+            </a:r>
+          </a:p>
+          <a:p>
+            <a:pPr lvl="1"/>
+            <a:r>
+              <a:rPr lang="en-AU" dirty="0" smtClean="0"/>
+              <a:t>You handle configuration or multiple input types</a:t>
+            </a:r>
+          </a:p>
+          <a:p>
+            <a:r>
+              <a:rPr lang="en-AU" dirty="0" smtClean="0"/>
+              <a:t>Configurable</a:t>
+            </a:r>
+          </a:p>
+          <a:p>
+            <a:pPr lvl="1"/>
+            <a:r>
+              <a:rPr lang="en-AU" dirty="0" smtClean="0"/>
+              <a:t>Check if a named input has been triggered</a:t>
+            </a:r>
+          </a:p>
+          <a:p>
+            <a:pPr lvl="1"/>
+            <a:r>
+              <a:rPr lang="en-AU" dirty="0" smtClean="0"/>
+              <a:t>Define these inputs in the Unity Editor</a:t>
+            </a:r>
+          </a:p>
+          <a:p>
+            <a:pPr lvl="1"/>
+            <a:r>
+              <a:rPr lang="en-AU" dirty="0" smtClean="0"/>
+              <a:t>Allows for multiple input types</a:t>
+            </a:r>
+            <a:endParaRPr lang="en-AU" dirty="0"/>
+          </a:p>
+        </p:txBody>
+      </p:sp>
+    </p:spTree>
+    <p:extLst>
+      <p:ext uri="{BB962C8B-B14F-4D97-AF65-F5344CB8AC3E}">
+        <p14:creationId xmlns:p14="http://schemas.microsoft.com/office/powerpoint/2010/main" val="908806141"/>
+      </p:ext>
+    </p:extLst>
+  </p:cSld>
+  <p:clrMapOvr>
+    <a:masterClrMapping/>
+  </p:clrMapOvr>
+</p:sld>
+</file>
+
+<file path=ppt/slides/slide12.xml><?xml version="1.0" encoding="utf-8"?>
+<p:sld xmlns:a="http://schemas.openxmlformats.org/drawingml/2006/main" xmlns:r="http://schemas.openxmlformats.org/officeDocument/2006/relationships" xmlns:p="http://schemas.openxmlformats.org/presentationml/2006/main">
+  <p:cSld>
+    <p:spTree>
+      <p:nvGrpSpPr>
+        <p:cNvPr id="1" name=""/>
+        <p:cNvGrpSpPr/>
+        <p:nvPr/>
+      </p:nvGrpSpPr>
+      <p:grpSpPr>
+        <a:xfrm>
+          <a:off x="0" y="0"/>
+          <a:ext cx="0" cy="0"/>
+          <a:chOff x="0" y="0"/>
+          <a:chExt cx="0" cy="0"/>
+        </a:xfrm>
+      </p:grpSpPr>
+      <p:sp>
+        <p:nvSpPr>
+          <p:cNvPr id="2" name="Title 1"/>
+          <p:cNvSpPr>
+            <a:spLocks noGrp="1"/>
+          </p:cNvSpPr>
+          <p:nvPr>
+            <p:ph type="title"/>
+          </p:nvPr>
+        </p:nvSpPr>
+        <p:spPr/>
+        <p:txBody>
+          <a:bodyPr/>
+          <a:lstStyle/>
+          <a:p>
+            <a:r>
+              <a:rPr lang="en-AU" dirty="0" smtClean="0"/>
+              <a:t>Game</a:t>
+            </a:r>
+            <a:endParaRPr lang="en-AU" dirty="0"/>
+          </a:p>
+        </p:txBody>
+      </p:sp>
+      <p:sp>
+        <p:nvSpPr>
+          <p:cNvPr id="4" name="Text Placeholder 3"/>
+          <p:cNvSpPr>
+            <a:spLocks noGrp="1"/>
+          </p:cNvSpPr>
+          <p:nvPr>
+            <p:ph type="body" idx="1"/>
+          </p:nvPr>
+        </p:nvSpPr>
+        <p:spPr/>
+        <p:txBody>
+          <a:bodyPr/>
+          <a:lstStyle/>
+          <a:p>
+            <a:endParaRPr lang="en-AU" dirty="0"/>
+          </a:p>
+        </p:txBody>
+      </p:sp>
+    </p:spTree>
+    <p:extLst>
+      <p:ext uri="{BB962C8B-B14F-4D97-AF65-F5344CB8AC3E}">
+        <p14:creationId xmlns:p14="http://schemas.microsoft.com/office/powerpoint/2010/main" val="783920217"/>
+      </p:ext>
+    </p:extLst>
+  </p:cSld>
+  <p:clrMapOvr>
+    <a:masterClrMapping/>
+  </p:clrMapOvr>
+</p:sld>
+</file>
+
 <file path=ppt/slides/slide2.xml><?xml version="1.0" encoding="utf-8"?>
 <p:sld xmlns:a="http://schemas.openxmlformats.org/drawingml/2006/main" xmlns:r="http://schemas.openxmlformats.org/officeDocument/2006/relationships" xmlns:p="http://schemas.openxmlformats.org/presentationml/2006/main">
   <p:cSld>
@@ -3985,11 +4308,7 @@
             <a:pPr lvl="1"/>
             <a:r>
               <a:rPr lang="en-AU" dirty="0" smtClean="0"/>
-              <a:t>Logical </a:t>
-            </a:r>
-            <a:r>
-              <a:rPr lang="en-AU" dirty="0" smtClean="0"/>
-              <a:t>objects</a:t>
+              <a:t>Logical objects</a:t>
             </a:r>
           </a:p>
           <a:p>
@@ -4018,16 +4337,11 @@
               <a:rPr lang="en-AU" dirty="0" smtClean="0"/>
               <a:t>Move parent and every child moves relative to parent</a:t>
             </a:r>
-            <a:endParaRPr lang="en-AU" dirty="0" smtClean="0"/>
-          </a:p>
-          <a:p>
-            <a:r>
-              <a:rPr lang="en-AU" dirty="0" smtClean="0"/>
-              <a:t>Has Components, which defin</a:t>
-            </a:r>
-            <a:r>
-              <a:rPr lang="en-AU" dirty="0" smtClean="0"/>
-              <a:t>e the object</a:t>
+          </a:p>
+          <a:p>
+            <a:r>
+              <a:rPr lang="en-AU" dirty="0" smtClean="0"/>
+              <a:t>Has Components, which define the object</a:t>
             </a:r>
             <a:endParaRPr lang="en-AU" dirty="0"/>
           </a:p>
@@ -4452,7 +4766,40 @@
           <a:bodyPr/>
           <a:lstStyle/>
           <a:p>
-            <a:endParaRPr lang="en-AU"/>
+            <a:r>
+              <a:rPr lang="en-AU" dirty="0" smtClean="0"/>
+              <a:t>Unity handles many formats</a:t>
+            </a:r>
+          </a:p>
+          <a:p>
+            <a:r>
+              <a:rPr lang="en-AU" dirty="0" smtClean="0"/>
+              <a:t>Images</a:t>
+            </a:r>
+          </a:p>
+          <a:p>
+            <a:r>
+              <a:rPr lang="en-AU" dirty="0" smtClean="0"/>
+              <a:t>Models</a:t>
+            </a:r>
+          </a:p>
+          <a:p>
+            <a:r>
+              <a:rPr lang="en-AU" dirty="0" smtClean="0"/>
+              <a:t>Audio</a:t>
+            </a:r>
+          </a:p>
+          <a:p>
+            <a:r>
+              <a:rPr lang="en-AU" dirty="0" smtClean="0"/>
+              <a:t>Place in project folder and boom</a:t>
+            </a:r>
+          </a:p>
+          <a:p>
+            <a:r>
+              <a:rPr lang="en-AU" dirty="0" smtClean="0"/>
+              <a:t>Configure in editor depending on file type</a:t>
+            </a:r>
           </a:p>
         </p:txBody>
       </p:sp>

</xml_diff>

<commit_message>
Added licensing info Added screenshots for UI overview
</commit_message>
<xml_diff>
--- a/ST_Unity_101_Part1.pptx
+++ b/ST_Unity_101_Part1.pptx
@@ -296,7 +296,7 @@
           <a:p>
             <a:fld id="{A724FAEC-7584-44B3-B386-6ADB31723F26}" type="datetimeFigureOut">
               <a:rPr lang="en-AU" smtClean="0"/>
-              <a:t>9/04/2014</a:t>
+              <a:t>28/04/2014</a:t>
             </a:fld>
             <a:endParaRPr lang="en-AU"/>
           </a:p>
@@ -750,7 +750,54 @@
           <a:bodyPr/>
           <a:lstStyle/>
           <a:p>
-            <a:endParaRPr lang="en-AU" dirty="0"/>
+            <a:r>
+              <a:rPr lang="en-AU" dirty="0" smtClean="0"/>
+              <a:t>You can sell games for free,</a:t>
+            </a:r>
+            <a:r>
+              <a:rPr lang="en-AU" baseline="0" dirty="0" smtClean="0"/>
+              <a:t> but there are limits before you require a pro license (many thousands). </a:t>
+            </a:r>
+            <a:r>
+              <a:rPr lang="en-AU" baseline="0" dirty="0" smtClean="0"/>
+              <a:t>If you want to use Pro features or exceed the free license limits, you need to purchase a Pro license. If you want to ship on a platform other than Win32 (Desktop Windows), Linux, Mac, or the Web, you need a pro license for the platform as well.</a:t>
+            </a:r>
+          </a:p>
+          <a:p>
+            <a:endParaRPr lang="en-AU" baseline="0" dirty="0" smtClean="0"/>
+          </a:p>
+          <a:p>
+            <a:r>
+              <a:rPr lang="en-AU" baseline="0" dirty="0" smtClean="0"/>
+              <a:t>The exception here is the Windows Store and Windows Phone 8, where the platform license is included with Unity Pro.</a:t>
+            </a:r>
+          </a:p>
+          <a:p>
+            <a:endParaRPr lang="en-AU" baseline="0" dirty="0"/>
+          </a:p>
+          <a:p>
+            <a:r>
+              <a:rPr lang="en-AU" baseline="0" dirty="0" smtClean="0"/>
+              <a:t>Therefore, if you wanted to ship your game with Pro features on Windows 8, WP8, iOS and Android, you need to pay $4500:</a:t>
+            </a:r>
+          </a:p>
+          <a:p>
+            <a:r>
+              <a:rPr lang="en-AU" baseline="0" dirty="0" smtClean="0"/>
+              <a:t>$1500 – Unity Pro</a:t>
+            </a:r>
+          </a:p>
+          <a:p>
+            <a:r>
+              <a:rPr lang="en-AU" baseline="0" dirty="0" smtClean="0"/>
+              <a:t>$1500 – iOS Pro</a:t>
+            </a:r>
+          </a:p>
+          <a:p>
+            <a:r>
+              <a:rPr lang="en-AU" baseline="0" dirty="0" smtClean="0"/>
+              <a:t>$1500 – Android Pro</a:t>
+            </a:r>
           </a:p>
         </p:txBody>
       </p:sp>
@@ -834,10 +881,6 @@
           <a:bodyPr/>
           <a:lstStyle/>
           <a:p>
-            <a:r>
-              <a:rPr lang="en-AU" dirty="0" smtClean="0"/>
-              <a:t>Change this to a diagram and split into multiple slides</a:t>
-            </a:r>
             <a:endParaRPr lang="en-AU" dirty="0"/>
           </a:p>
         </p:txBody>
@@ -859,7 +902,7 @@
           <a:p>
             <a:fld id="{814B4410-C701-44AF-9574-9C423ED2E94B}" type="slidenum">
               <a:rPr lang="en-AU" smtClean="0"/>
-              <a:t>18</a:t>
+              <a:t>4</a:t>
             </a:fld>
             <a:endParaRPr lang="en-AU"/>
           </a:p>
@@ -868,7 +911,7 @@
     </p:spTree>
     <p:extLst>
       <p:ext uri="{BB962C8B-B14F-4D97-AF65-F5344CB8AC3E}">
-        <p14:creationId xmlns:p14="http://schemas.microsoft.com/office/powerpoint/2010/main" val="1783817807"/>
+        <p14:creationId xmlns:p14="http://schemas.microsoft.com/office/powerpoint/2010/main" val="2977393219"/>
       </p:ext>
     </p:extLst>
   </p:cSld>
@@ -924,6 +967,94 @@
           <a:p>
             <a:r>
               <a:rPr lang="en-AU" dirty="0" smtClean="0"/>
+              <a:t>Change this to a diagram and split into multiple slides</a:t>
+            </a:r>
+            <a:endParaRPr lang="en-AU" dirty="0"/>
+          </a:p>
+        </p:txBody>
+      </p:sp>
+      <p:sp>
+        <p:nvSpPr>
+          <p:cNvPr id="4" name="Slide Number Placeholder 3"/>
+          <p:cNvSpPr>
+            <a:spLocks noGrp="1"/>
+          </p:cNvSpPr>
+          <p:nvPr>
+            <p:ph type="sldNum" sz="quarter" idx="10"/>
+          </p:nvPr>
+        </p:nvSpPr>
+        <p:spPr/>
+        <p:txBody>
+          <a:bodyPr/>
+          <a:lstStyle/>
+          <a:p>
+            <a:fld id="{814B4410-C701-44AF-9574-9C423ED2E94B}" type="slidenum">
+              <a:rPr lang="en-AU" smtClean="0"/>
+              <a:t>18</a:t>
+            </a:fld>
+            <a:endParaRPr lang="en-AU"/>
+          </a:p>
+        </p:txBody>
+      </p:sp>
+    </p:spTree>
+    <p:extLst>
+      <p:ext uri="{BB962C8B-B14F-4D97-AF65-F5344CB8AC3E}">
+        <p14:creationId xmlns:p14="http://schemas.microsoft.com/office/powerpoint/2010/main" val="1783817807"/>
+      </p:ext>
+    </p:extLst>
+  </p:cSld>
+  <p:clrMapOvr>
+    <a:masterClrMapping/>
+  </p:clrMapOvr>
+</p:notes>
+</file>
+
+<file path=ppt/notesSlides/notesSlide5.xml><?xml version="1.0" encoding="utf-8"?>
+<p:notes xmlns:a="http://schemas.openxmlformats.org/drawingml/2006/main" xmlns:r="http://schemas.openxmlformats.org/officeDocument/2006/relationships" xmlns:p="http://schemas.openxmlformats.org/presentationml/2006/main">
+  <p:cSld>
+    <p:spTree>
+      <p:nvGrpSpPr>
+        <p:cNvPr id="1" name=""/>
+        <p:cNvGrpSpPr/>
+        <p:nvPr/>
+      </p:nvGrpSpPr>
+      <p:grpSpPr>
+        <a:xfrm>
+          <a:off x="0" y="0"/>
+          <a:ext cx="0" cy="0"/>
+          <a:chOff x="0" y="0"/>
+          <a:chExt cx="0" cy="0"/>
+        </a:xfrm>
+      </p:grpSpPr>
+      <p:sp>
+        <p:nvSpPr>
+          <p:cNvPr id="2" name="Slide Image Placeholder 1"/>
+          <p:cNvSpPr>
+            <a:spLocks noGrp="1" noRot="1" noChangeAspect="1"/>
+          </p:cNvSpPr>
+          <p:nvPr>
+            <p:ph type="sldImg"/>
+          </p:nvPr>
+        </p:nvSpPr>
+        <p:spPr/>
+      </p:sp>
+      <p:sp>
+        <p:nvSpPr>
+          <p:cNvPr id="3" name="Notes Placeholder 2"/>
+          <p:cNvSpPr>
+            <a:spLocks noGrp="1"/>
+          </p:cNvSpPr>
+          <p:nvPr>
+            <p:ph type="body" idx="1"/>
+          </p:nvPr>
+        </p:nvSpPr>
+        <p:spPr/>
+        <p:txBody>
+          <a:bodyPr/>
+          <a:lstStyle/>
+          <a:p>
+            <a:r>
+              <a:rPr lang="en-AU" dirty="0" smtClean="0"/>
               <a:t>Details</a:t>
             </a:r>
             <a:r>
@@ -970,7 +1101,7 @@
 </p:notes>
 </file>
 
-<file path=ppt/notesSlides/notesSlide5.xml><?xml version="1.0" encoding="utf-8"?>
+<file path=ppt/notesSlides/notesSlide6.xml><?xml version="1.0" encoding="utf-8"?>
 <p:notes xmlns:a="http://schemas.openxmlformats.org/drawingml/2006/main" xmlns:r="http://schemas.openxmlformats.org/officeDocument/2006/relationships" xmlns:p="http://schemas.openxmlformats.org/presentationml/2006/main">
   <p:cSld>
     <p:spTree>
@@ -1193,7 +1324,7 @@
           <a:p>
             <a:fld id="{C33626A4-D0D9-4927-8F98-739B1D29D8AB}" type="datetimeFigureOut">
               <a:rPr lang="en-AU" smtClean="0"/>
-              <a:t>9/04/2014</a:t>
+              <a:t>28/04/2014</a:t>
             </a:fld>
             <a:endParaRPr lang="en-AU"/>
           </a:p>
@@ -1363,7 +1494,7 @@
           <a:p>
             <a:fld id="{C33626A4-D0D9-4927-8F98-739B1D29D8AB}" type="datetimeFigureOut">
               <a:rPr lang="en-AU" smtClean="0"/>
-              <a:t>9/04/2014</a:t>
+              <a:t>28/04/2014</a:t>
             </a:fld>
             <a:endParaRPr lang="en-AU"/>
           </a:p>
@@ -1543,7 +1674,7 @@
           <a:p>
             <a:fld id="{C33626A4-D0D9-4927-8F98-739B1D29D8AB}" type="datetimeFigureOut">
               <a:rPr lang="en-AU" smtClean="0"/>
-              <a:t>9/04/2014</a:t>
+              <a:t>28/04/2014</a:t>
             </a:fld>
             <a:endParaRPr lang="en-AU"/>
           </a:p>
@@ -1713,7 +1844,7 @@
           <a:p>
             <a:fld id="{C33626A4-D0D9-4927-8F98-739B1D29D8AB}" type="datetimeFigureOut">
               <a:rPr lang="en-AU" smtClean="0"/>
-              <a:t>9/04/2014</a:t>
+              <a:t>28/04/2014</a:t>
             </a:fld>
             <a:endParaRPr lang="en-AU"/>
           </a:p>
@@ -1959,7 +2090,7 @@
           <a:p>
             <a:fld id="{C33626A4-D0D9-4927-8F98-739B1D29D8AB}" type="datetimeFigureOut">
               <a:rPr lang="en-AU" smtClean="0"/>
-              <a:t>9/04/2014</a:t>
+              <a:t>28/04/2014</a:t>
             </a:fld>
             <a:endParaRPr lang="en-AU"/>
           </a:p>
@@ -2191,7 +2322,7 @@
           <a:p>
             <a:fld id="{C33626A4-D0D9-4927-8F98-739B1D29D8AB}" type="datetimeFigureOut">
               <a:rPr lang="en-AU" smtClean="0"/>
-              <a:t>9/04/2014</a:t>
+              <a:t>28/04/2014</a:t>
             </a:fld>
             <a:endParaRPr lang="en-AU"/>
           </a:p>
@@ -2558,7 +2689,7 @@
           <a:p>
             <a:fld id="{C33626A4-D0D9-4927-8F98-739B1D29D8AB}" type="datetimeFigureOut">
               <a:rPr lang="en-AU" smtClean="0"/>
-              <a:t>9/04/2014</a:t>
+              <a:t>28/04/2014</a:t>
             </a:fld>
             <a:endParaRPr lang="en-AU"/>
           </a:p>
@@ -2676,7 +2807,7 @@
           <a:p>
             <a:fld id="{C33626A4-D0D9-4927-8F98-739B1D29D8AB}" type="datetimeFigureOut">
               <a:rPr lang="en-AU" smtClean="0"/>
-              <a:t>9/04/2014</a:t>
+              <a:t>28/04/2014</a:t>
             </a:fld>
             <a:endParaRPr lang="en-AU"/>
           </a:p>
@@ -2771,7 +2902,7 @@
           <a:p>
             <a:fld id="{C33626A4-D0D9-4927-8F98-739B1D29D8AB}" type="datetimeFigureOut">
               <a:rPr lang="en-AU" smtClean="0"/>
-              <a:t>9/04/2014</a:t>
+              <a:t>28/04/2014</a:t>
             </a:fld>
             <a:endParaRPr lang="en-AU"/>
           </a:p>
@@ -3048,7 +3179,7 @@
           <a:p>
             <a:fld id="{C33626A4-D0D9-4927-8F98-739B1D29D8AB}" type="datetimeFigureOut">
               <a:rPr lang="en-AU" smtClean="0"/>
-              <a:t>9/04/2014</a:t>
+              <a:t>28/04/2014</a:t>
             </a:fld>
             <a:endParaRPr lang="en-AU"/>
           </a:p>
@@ -3301,7 +3432,7 @@
           <a:p>
             <a:fld id="{C33626A4-D0D9-4927-8F98-739B1D29D8AB}" type="datetimeFigureOut">
               <a:rPr lang="en-AU" smtClean="0"/>
-              <a:t>9/04/2014</a:t>
+              <a:t>28/04/2014</a:t>
             </a:fld>
             <a:endParaRPr lang="en-AU"/>
           </a:p>
@@ -3514,7 +3645,7 @@
           <a:p>
             <a:fld id="{C33626A4-D0D9-4927-8F98-739B1D29D8AB}" type="datetimeFigureOut">
               <a:rPr lang="en-AU" smtClean="0"/>
-              <a:t>9/04/2014</a:t>
+              <a:t>28/04/2014</a:t>
             </a:fld>
             <a:endParaRPr lang="en-AU"/>
           </a:p>
@@ -6326,7 +6457,14 @@
           <a:p>
             <a:r>
               <a:rPr lang="en-AU" dirty="0" smtClean="0"/>
-              <a:t>Making a Game</a:t>
+              <a:t/>
+            </a:r>
+            <a:br>
+              <a:rPr lang="en-AU" dirty="0" smtClean="0"/>
+            </a:br>
+            <a:r>
+              <a:rPr lang="en-AU" dirty="0" smtClean="0"/>
+              <a:t>Agenda</a:t>
             </a:r>
             <a:endParaRPr lang="en-AU" dirty="0"/>
           </a:p>
@@ -6349,8 +6487,16 @@
           <a:p>
             <a:r>
               <a:rPr lang="en-AU" dirty="0" smtClean="0"/>
-              <a:t>Unity </a:t>
-            </a:r>
+              <a:t>Unity Interface</a:t>
+            </a:r>
+          </a:p>
+          <a:p>
+            <a:r>
+              <a:rPr lang="en-AU" dirty="0" smtClean="0"/>
+              <a:t>Scripting</a:t>
+            </a:r>
+          </a:p>
+          <a:p>
             <a:r>
               <a:rPr lang="en-AU" dirty="0" err="1" smtClean="0"/>
               <a:t>GameObjects</a:t>
@@ -6363,25 +6509,13 @@
           <a:p>
             <a:r>
               <a:rPr lang="en-AU" dirty="0" smtClean="0"/>
-              <a:t>Scripting</a:t>
-            </a:r>
-          </a:p>
-          <a:p>
-            <a:r>
-              <a:rPr lang="en-AU" dirty="0" smtClean="0"/>
-              <a:t>Tools</a:t>
-            </a:r>
-          </a:p>
-          <a:p>
-            <a:r>
-              <a:rPr lang="en-AU" dirty="0" smtClean="0"/>
-              <a:t>Asset Management</a:t>
-            </a:r>
-          </a:p>
-          <a:p>
-            <a:r>
-              <a:rPr lang="en-AU" dirty="0" smtClean="0"/>
-              <a:t>Rendering</a:t>
+              <a:t>Prefabs</a:t>
+            </a:r>
+          </a:p>
+          <a:p>
+            <a:r>
+              <a:rPr lang="en-AU" dirty="0" smtClean="0"/>
+              <a:t>3D Rendering</a:t>
             </a:r>
           </a:p>
           <a:p>
@@ -6393,8 +6527,15 @@
           <a:p>
             <a:r>
               <a:rPr lang="en-AU" dirty="0" smtClean="0"/>
-              <a:t>Audio</a:t>
-            </a:r>
+              <a:t>Physics</a:t>
+            </a:r>
+          </a:p>
+          <a:p>
+            <a:r>
+              <a:rPr lang="en-AU" dirty="0" smtClean="0"/>
+              <a:t>Windows Store Specifics</a:t>
+            </a:r>
+            <a:endParaRPr lang="en-AU" dirty="0" smtClean="0"/>
           </a:p>
         </p:txBody>
       </p:sp>
@@ -6542,29 +6683,38 @@
           <a:bodyPr/>
           <a:lstStyle/>
           <a:p>
-            <a:endParaRPr lang="en-AU"/>
-          </a:p>
-        </p:txBody>
-      </p:sp>
-      <p:sp>
-        <p:nvSpPr>
-          <p:cNvPr id="8" name="Content Placeholder 7"/>
-          <p:cNvSpPr>
-            <a:spLocks noGrp="1"/>
-          </p:cNvSpPr>
+            <a:endParaRPr lang="en-AU" dirty="0"/>
+          </a:p>
+        </p:txBody>
+      </p:sp>
+      <p:pic>
+        <p:nvPicPr>
+          <p:cNvPr id="4" name="Content Placeholder 3"/>
+          <p:cNvPicPr>
+            <a:picLocks noGrp="1" noChangeAspect="1"/>
+          </p:cNvPicPr>
           <p:nvPr>
             <p:ph sz="half" idx="2"/>
           </p:nvPr>
-        </p:nvSpPr>
-        <p:spPr/>
-        <p:txBody>
-          <a:bodyPr/>
-          <a:lstStyle/>
-          <a:p>
-            <a:endParaRPr lang="en-AU"/>
-          </a:p>
-        </p:txBody>
-      </p:sp>
+        </p:nvPicPr>
+        <p:blipFill rotWithShape="1">
+          <a:blip r:embed="rId2" cstate="print">
+            <a:extLst>
+              <a:ext uri="{28A0092B-C50C-407E-A947-70E740481C1C}">
+                <a14:useLocalDpi xmlns:a14="http://schemas.microsoft.com/office/drawing/2010/main" val="0"/>
+              </a:ext>
+            </a:extLst>
+          </a:blip>
+          <a:srcRect l="98" t="9168" r="47549" b="28395"/>
+          <a:stretch/>
+        </p:blipFill>
+        <p:spPr>
+          <a:xfrm>
+            <a:off x="6096000" y="2135346"/>
+            <a:ext cx="5826994" cy="3731895"/>
+          </a:xfrm>
+        </p:spPr>
+      </p:pic>
     </p:spTree>
     <p:extLst>
       <p:ext uri="{BB962C8B-B14F-4D97-AF65-F5344CB8AC3E}">
@@ -6637,25 +6787,34 @@
           </a:p>
         </p:txBody>
       </p:sp>
-      <p:sp>
-        <p:nvSpPr>
-          <p:cNvPr id="4" name="Content Placeholder 3"/>
-          <p:cNvSpPr>
-            <a:spLocks noGrp="1"/>
-          </p:cNvSpPr>
+      <p:pic>
+        <p:nvPicPr>
+          <p:cNvPr id="7" name="Content Placeholder 6"/>
+          <p:cNvPicPr>
+            <a:picLocks noGrp="1" noChangeAspect="1"/>
+          </p:cNvPicPr>
           <p:nvPr>
             <p:ph sz="half" idx="2"/>
           </p:nvPr>
-        </p:nvSpPr>
-        <p:spPr/>
-        <p:txBody>
-          <a:bodyPr/>
-          <a:lstStyle/>
-          <a:p>
-            <a:endParaRPr lang="en-AU"/>
-          </a:p>
-        </p:txBody>
-      </p:sp>
+        </p:nvPicPr>
+        <p:blipFill rotWithShape="1">
+          <a:blip r:embed="rId2" cstate="print">
+            <a:extLst>
+              <a:ext uri="{28A0092B-C50C-407E-A947-70E740481C1C}">
+                <a14:useLocalDpi xmlns:a14="http://schemas.microsoft.com/office/drawing/2010/main" val="0"/>
+              </a:ext>
+            </a:extLst>
+          </a:blip>
+          <a:srcRect l="70686" t="8073" r="14412" b="64543"/>
+          <a:stretch/>
+        </p:blipFill>
+        <p:spPr>
+          <a:xfrm>
+            <a:off x="7081520" y="2152173"/>
+            <a:ext cx="3747546" cy="3698241"/>
+          </a:xfrm>
+        </p:spPr>
+      </p:pic>
     </p:spTree>
     <p:extLst>
       <p:ext uri="{BB962C8B-B14F-4D97-AF65-F5344CB8AC3E}">
@@ -6728,25 +6887,34 @@
           </a:p>
         </p:txBody>
       </p:sp>
-      <p:sp>
-        <p:nvSpPr>
-          <p:cNvPr id="4" name="Content Placeholder 3"/>
-          <p:cNvSpPr>
-            <a:spLocks noGrp="1"/>
-          </p:cNvSpPr>
+      <p:pic>
+        <p:nvPicPr>
+          <p:cNvPr id="5" name="Content Placeholder 4"/>
+          <p:cNvPicPr>
+            <a:picLocks noGrp="1" noChangeAspect="1"/>
+          </p:cNvPicPr>
           <p:nvPr>
             <p:ph sz="half" idx="2"/>
           </p:nvPr>
-        </p:nvSpPr>
-        <p:spPr/>
-        <p:txBody>
-          <a:bodyPr/>
-          <a:lstStyle/>
-          <a:p>
-            <a:endParaRPr lang="en-AU"/>
-          </a:p>
-        </p:txBody>
-      </p:sp>
+        </p:nvPicPr>
+        <p:blipFill rotWithShape="1">
+          <a:blip r:embed="rId2" cstate="print">
+            <a:extLst>
+              <a:ext uri="{28A0092B-C50C-407E-A947-70E740481C1C}">
+                <a14:useLocalDpi xmlns:a14="http://schemas.microsoft.com/office/drawing/2010/main" val="0"/>
+              </a:ext>
+            </a:extLst>
+          </a:blip>
+          <a:srcRect l="84216" t="8073" r="490" b="71115"/>
+          <a:stretch/>
+        </p:blipFill>
+        <p:spPr>
+          <a:xfrm>
+            <a:off x="6668443" y="2289333"/>
+            <a:ext cx="4685357" cy="3423921"/>
+          </a:xfrm>
+        </p:spPr>
+      </p:pic>
     </p:spTree>
     <p:extLst>
       <p:ext uri="{BB962C8B-B14F-4D97-AF65-F5344CB8AC3E}">
@@ -6819,25 +6987,35 @@
           </a:p>
         </p:txBody>
       </p:sp>
-      <p:sp>
-        <p:nvSpPr>
-          <p:cNvPr id="4" name="Content Placeholder 3"/>
-          <p:cNvSpPr>
-            <a:spLocks noGrp="1"/>
-          </p:cNvSpPr>
+      <p:pic>
+        <p:nvPicPr>
+          <p:cNvPr id="5" name="Content Placeholder 4"/>
+          <p:cNvPicPr>
+            <a:picLocks noGrp="1" noChangeAspect="1"/>
+          </p:cNvPicPr>
           <p:nvPr>
             <p:ph sz="half" idx="2"/>
           </p:nvPr>
-        </p:nvSpPr>
-        <p:spPr/>
-        <p:txBody>
-          <a:bodyPr/>
-          <a:lstStyle/>
-          <a:p>
-            <a:endParaRPr lang="en-AU"/>
-          </a:p>
-        </p:txBody>
-      </p:sp>
+        </p:nvPicPr>
+        <p:blipFill>
+          <a:blip r:embed="rId2">
+            <a:extLst>
+              <a:ext uri="{28A0092B-C50C-407E-A947-70E740481C1C}">
+                <a14:useLocalDpi xmlns:a14="http://schemas.microsoft.com/office/drawing/2010/main" val="0"/>
+              </a:ext>
+            </a:extLst>
+          </a:blip>
+          <a:stretch>
+            <a:fillRect/>
+          </a:stretch>
+        </p:blipFill>
+        <p:spPr>
+          <a:xfrm>
+            <a:off x="7368419" y="2004681"/>
+            <a:ext cx="2789162" cy="3993226"/>
+          </a:xfrm>
+        </p:spPr>
+      </p:pic>
     </p:spTree>
     <p:extLst>
       <p:ext uri="{BB962C8B-B14F-4D97-AF65-F5344CB8AC3E}">

</xml_diff>

<commit_message>
Added notes on scenes and loadlevel for future elaboration
</commit_message>
<xml_diff>
--- a/ST_Unity_101_Part1.pptx
+++ b/ST_Unity_101_Part1.pptx
@@ -5,7 +5,7 @@
     <p:sldMasterId id="2147483648" r:id="rId1"/>
   </p:sldMasterIdLst>
   <p:notesMasterIdLst>
-    <p:notesMasterId r:id="rId35"/>
+    <p:notesMasterId r:id="rId36"/>
   </p:notesMasterIdLst>
   <p:sldIdLst>
     <p:sldId id="256" r:id="rId2"/>
@@ -22,25 +22,26 @@
     <p:sldId id="260" r:id="rId13"/>
     <p:sldId id="261" r:id="rId14"/>
     <p:sldId id="289" r:id="rId15"/>
-    <p:sldId id="275" r:id="rId16"/>
-    <p:sldId id="264" r:id="rId17"/>
-    <p:sldId id="263" r:id="rId18"/>
-    <p:sldId id="276" r:id="rId19"/>
-    <p:sldId id="265" r:id="rId20"/>
-    <p:sldId id="266" r:id="rId21"/>
-    <p:sldId id="277" r:id="rId22"/>
-    <p:sldId id="278" r:id="rId23"/>
-    <p:sldId id="279" r:id="rId24"/>
-    <p:sldId id="280" r:id="rId25"/>
-    <p:sldId id="268" r:id="rId26"/>
-    <p:sldId id="281" r:id="rId27"/>
-    <p:sldId id="282" r:id="rId28"/>
-    <p:sldId id="283" r:id="rId29"/>
-    <p:sldId id="284" r:id="rId30"/>
-    <p:sldId id="287" r:id="rId31"/>
-    <p:sldId id="285" r:id="rId32"/>
-    <p:sldId id="286" r:id="rId33"/>
-    <p:sldId id="288" r:id="rId34"/>
+    <p:sldId id="290" r:id="rId16"/>
+    <p:sldId id="275" r:id="rId17"/>
+    <p:sldId id="264" r:id="rId18"/>
+    <p:sldId id="263" r:id="rId19"/>
+    <p:sldId id="276" r:id="rId20"/>
+    <p:sldId id="265" r:id="rId21"/>
+    <p:sldId id="266" r:id="rId22"/>
+    <p:sldId id="277" r:id="rId23"/>
+    <p:sldId id="278" r:id="rId24"/>
+    <p:sldId id="279" r:id="rId25"/>
+    <p:sldId id="280" r:id="rId26"/>
+    <p:sldId id="268" r:id="rId27"/>
+    <p:sldId id="281" r:id="rId28"/>
+    <p:sldId id="282" r:id="rId29"/>
+    <p:sldId id="283" r:id="rId30"/>
+    <p:sldId id="284" r:id="rId31"/>
+    <p:sldId id="287" r:id="rId32"/>
+    <p:sldId id="285" r:id="rId33"/>
+    <p:sldId id="286" r:id="rId34"/>
+    <p:sldId id="288" r:id="rId35"/>
   </p:sldIdLst>
   <p:sldSz cx="12192000" cy="6858000"/>
   <p:notesSz cx="6858000" cy="9144000"/>
@@ -166,6 +167,7 @@
             <p14:sldId id="260"/>
             <p14:sldId id="261"/>
             <p14:sldId id="289"/>
+            <p14:sldId id="290"/>
           </p14:sldIdLst>
         </p14:section>
         <p14:section name="Putting it Together" id="{768B1791-35DA-4C74-AD3D-EEFACF3D6993}">
@@ -298,7 +300,7 @@
           <a:p>
             <a:fld id="{A724FAEC-7584-44B3-B386-6ADB31723F26}" type="datetimeFigureOut">
               <a:rPr lang="en-AU" smtClean="0"/>
-              <a:t>30/04/2014</a:t>
+              <a:t>6/05/2014</a:t>
             </a:fld>
             <a:endParaRPr lang="en-AU"/>
           </a:p>
@@ -1200,7 +1202,7 @@
           <a:p>
             <a:fld id="{814B4410-C701-44AF-9574-9C423ED2E94B}" type="slidenum">
               <a:rPr lang="en-AU" smtClean="0"/>
-              <a:t>19</a:t>
+              <a:t>20</a:t>
             </a:fld>
             <a:endParaRPr lang="en-AU"/>
           </a:p>
@@ -1292,7 +1294,7 @@
           <a:p>
             <a:fld id="{814B4410-C701-44AF-9574-9C423ED2E94B}" type="slidenum">
               <a:rPr lang="en-AU" smtClean="0"/>
-              <a:t>23</a:t>
+              <a:t>24</a:t>
             </a:fld>
             <a:endParaRPr lang="en-AU"/>
           </a:p>
@@ -1384,7 +1386,7 @@
           <a:p>
             <a:fld id="{814B4410-C701-44AF-9574-9C423ED2E94B}" type="slidenum">
               <a:rPr lang="en-AU" smtClean="0"/>
-              <a:t>30</a:t>
+              <a:t>31</a:t>
             </a:fld>
             <a:endParaRPr lang="en-AU"/>
           </a:p>
@@ -1534,7 +1536,7 @@
           <a:p>
             <a:fld id="{C33626A4-D0D9-4927-8F98-739B1D29D8AB}" type="datetimeFigureOut">
               <a:rPr lang="en-AU" smtClean="0"/>
-              <a:t>30/04/2014</a:t>
+              <a:t>6/05/2014</a:t>
             </a:fld>
             <a:endParaRPr lang="en-AU"/>
           </a:p>
@@ -1704,7 +1706,7 @@
           <a:p>
             <a:fld id="{C33626A4-D0D9-4927-8F98-739B1D29D8AB}" type="datetimeFigureOut">
               <a:rPr lang="en-AU" smtClean="0"/>
-              <a:t>30/04/2014</a:t>
+              <a:t>6/05/2014</a:t>
             </a:fld>
             <a:endParaRPr lang="en-AU"/>
           </a:p>
@@ -1884,7 +1886,7 @@
           <a:p>
             <a:fld id="{C33626A4-D0D9-4927-8F98-739B1D29D8AB}" type="datetimeFigureOut">
               <a:rPr lang="en-AU" smtClean="0"/>
-              <a:t>30/04/2014</a:t>
+              <a:t>6/05/2014</a:t>
             </a:fld>
             <a:endParaRPr lang="en-AU"/>
           </a:p>
@@ -2054,7 +2056,7 @@
           <a:p>
             <a:fld id="{C33626A4-D0D9-4927-8F98-739B1D29D8AB}" type="datetimeFigureOut">
               <a:rPr lang="en-AU" smtClean="0"/>
-              <a:t>30/04/2014</a:t>
+              <a:t>6/05/2014</a:t>
             </a:fld>
             <a:endParaRPr lang="en-AU"/>
           </a:p>
@@ -2300,7 +2302,7 @@
           <a:p>
             <a:fld id="{C33626A4-D0D9-4927-8F98-739B1D29D8AB}" type="datetimeFigureOut">
               <a:rPr lang="en-AU" smtClean="0"/>
-              <a:t>30/04/2014</a:t>
+              <a:t>6/05/2014</a:t>
             </a:fld>
             <a:endParaRPr lang="en-AU"/>
           </a:p>
@@ -2532,7 +2534,7 @@
           <a:p>
             <a:fld id="{C33626A4-D0D9-4927-8F98-739B1D29D8AB}" type="datetimeFigureOut">
               <a:rPr lang="en-AU" smtClean="0"/>
-              <a:t>30/04/2014</a:t>
+              <a:t>6/05/2014</a:t>
             </a:fld>
             <a:endParaRPr lang="en-AU"/>
           </a:p>
@@ -2899,7 +2901,7 @@
           <a:p>
             <a:fld id="{C33626A4-D0D9-4927-8F98-739B1D29D8AB}" type="datetimeFigureOut">
               <a:rPr lang="en-AU" smtClean="0"/>
-              <a:t>30/04/2014</a:t>
+              <a:t>6/05/2014</a:t>
             </a:fld>
             <a:endParaRPr lang="en-AU"/>
           </a:p>
@@ -3017,7 +3019,7 @@
           <a:p>
             <a:fld id="{C33626A4-D0D9-4927-8F98-739B1D29D8AB}" type="datetimeFigureOut">
               <a:rPr lang="en-AU" smtClean="0"/>
-              <a:t>30/04/2014</a:t>
+              <a:t>6/05/2014</a:t>
             </a:fld>
             <a:endParaRPr lang="en-AU"/>
           </a:p>
@@ -3112,7 +3114,7 @@
           <a:p>
             <a:fld id="{C33626A4-D0D9-4927-8F98-739B1D29D8AB}" type="datetimeFigureOut">
               <a:rPr lang="en-AU" smtClean="0"/>
-              <a:t>30/04/2014</a:t>
+              <a:t>6/05/2014</a:t>
             </a:fld>
             <a:endParaRPr lang="en-AU"/>
           </a:p>
@@ -3389,7 +3391,7 @@
           <a:p>
             <a:fld id="{C33626A4-D0D9-4927-8F98-739B1D29D8AB}" type="datetimeFigureOut">
               <a:rPr lang="en-AU" smtClean="0"/>
-              <a:t>30/04/2014</a:t>
+              <a:t>6/05/2014</a:t>
             </a:fld>
             <a:endParaRPr lang="en-AU"/>
           </a:p>
@@ -3642,7 +3644,7 @@
           <a:p>
             <a:fld id="{C33626A4-D0D9-4927-8F98-739B1D29D8AB}" type="datetimeFigureOut">
               <a:rPr lang="en-AU" smtClean="0"/>
-              <a:t>30/04/2014</a:t>
+              <a:t>6/05/2014</a:t>
             </a:fld>
             <a:endParaRPr lang="en-AU"/>
           </a:p>
@@ -3855,7 +3857,7 @@
           <a:p>
             <a:fld id="{C33626A4-D0D9-4927-8F98-739B1D29D8AB}" type="datetimeFigureOut">
               <a:rPr lang="en-AU" smtClean="0"/>
-              <a:t>30/04/2014</a:t>
+              <a:t>6/05/2014</a:t>
             </a:fld>
             <a:endParaRPr lang="en-AU"/>
           </a:p>
@@ -4919,7 +4921,7 @@
       </p:grpSpPr>
       <p:sp>
         <p:nvSpPr>
-          <p:cNvPr id="4" name="Title 3"/>
+          <p:cNvPr id="2" name="Title 1"/>
           <p:cNvSpPr>
             <a:spLocks noGrp="1"/>
           </p:cNvSpPr>
@@ -4934,15 +4936,7 @@
           <a:p>
             <a:r>
               <a:rPr lang="en-AU" dirty="0" smtClean="0"/>
-              <a:t>Putting </a:t>
-            </a:r>
-            <a:r>
-              <a:rPr lang="en-AU" dirty="0"/>
-              <a:t>I</a:t>
-            </a:r>
-            <a:r>
-              <a:rPr lang="en-AU" dirty="0" smtClean="0"/>
-              <a:t>t Together</a:t>
+              <a:t>Scenes</a:t>
             </a:r>
             <a:endParaRPr lang="en-AU" dirty="0"/>
           </a:p>
@@ -4950,27 +4944,72 @@
       </p:sp>
       <p:sp>
         <p:nvSpPr>
-          <p:cNvPr id="5" name="Text Placeholder 4"/>
-          <p:cNvSpPr>
-            <a:spLocks noGrp="1"/>
-          </p:cNvSpPr>
-          <p:nvPr>
-            <p:ph type="body" idx="1"/>
-          </p:nvPr>
-        </p:nvSpPr>
-        <p:spPr/>
-        <p:txBody>
-          <a:bodyPr/>
-          <a:lstStyle/>
-          <a:p>
-            <a:endParaRPr lang="en-AU"/>
+          <p:cNvPr id="3" name="Content Placeholder 2"/>
+          <p:cNvSpPr>
+            <a:spLocks noGrp="1"/>
+          </p:cNvSpPr>
+          <p:nvPr>
+            <p:ph idx="1"/>
+          </p:nvPr>
+        </p:nvSpPr>
+        <p:spPr/>
+        <p:txBody>
+          <a:bodyPr/>
+          <a:lstStyle/>
+          <a:p>
+            <a:r>
+              <a:rPr lang="en-AU" dirty="0" smtClean="0"/>
+              <a:t>Stores a </a:t>
+            </a:r>
+            <a:r>
+              <a:rPr lang="en-AU" dirty="0" err="1" smtClean="0"/>
+              <a:t>GameObject</a:t>
+            </a:r>
+            <a:r>
+              <a:rPr lang="en-AU" dirty="0" smtClean="0"/>
+              <a:t> hierarchy</a:t>
+            </a:r>
+          </a:p>
+          <a:p>
+            <a:r>
+              <a:rPr lang="en-AU" dirty="0" err="1" smtClean="0"/>
+              <a:t>Filetype</a:t>
+            </a:r>
+            <a:r>
+              <a:rPr lang="en-AU" smtClean="0"/>
+              <a:t> is &lt;name</a:t>
+            </a:r>
+            <a:r>
+              <a:rPr lang="en-AU" dirty="0" smtClean="0"/>
+              <a:t>&gt;.unity</a:t>
+            </a:r>
+          </a:p>
+          <a:p>
+            <a:r>
+              <a:rPr lang="en-AU" dirty="0" err="1" smtClean="0"/>
+              <a:t>Application.LoadLevel</a:t>
+            </a:r>
+            <a:endParaRPr lang="en-AU" dirty="0" smtClean="0"/>
+          </a:p>
+          <a:p>
+            <a:r>
+              <a:rPr lang="en-AU" dirty="0" err="1" smtClean="0"/>
+              <a:t>Application.LoadLevelAdditive</a:t>
+            </a:r>
+            <a:endParaRPr lang="en-AU" dirty="0" smtClean="0"/>
+          </a:p>
+          <a:p>
+            <a:r>
+              <a:rPr lang="en-AU" dirty="0" smtClean="0"/>
+              <a:t>[Pro] Asynchronous Loading</a:t>
+            </a:r>
           </a:p>
         </p:txBody>
       </p:sp>
     </p:spTree>
     <p:extLst>
       <p:ext uri="{BB962C8B-B14F-4D97-AF65-F5344CB8AC3E}">
-        <p14:creationId xmlns:p14="http://schemas.microsoft.com/office/powerpoint/2010/main" val="2508853452"/>
+        <p14:creationId xmlns:p14="http://schemas.microsoft.com/office/powerpoint/2010/main" val="3223928873"/>
       </p:ext>
     </p:extLst>
   </p:cSld>
@@ -4999,7 +5038,7 @@
       </p:grpSpPr>
       <p:sp>
         <p:nvSpPr>
-          <p:cNvPr id="2" name="Title 1"/>
+          <p:cNvPr id="4" name="Title 3"/>
           <p:cNvSpPr>
             <a:spLocks noGrp="1"/>
           </p:cNvSpPr>
@@ -5014,7 +5053,15 @@
           <a:p>
             <a:r>
               <a:rPr lang="en-AU" dirty="0" smtClean="0"/>
-              <a:t>Prefabs</a:t>
+              <a:t>Putting </a:t>
+            </a:r>
+            <a:r>
+              <a:rPr lang="en-AU" dirty="0"/>
+              <a:t>I</a:t>
+            </a:r>
+            <a:r>
+              <a:rPr lang="en-AU" dirty="0" smtClean="0"/>
+              <a:t>t Together</a:t>
             </a:r>
             <a:endParaRPr lang="en-AU" dirty="0"/>
           </a:p>
@@ -5022,56 +5069,27 @@
       </p:sp>
       <p:sp>
         <p:nvSpPr>
-          <p:cNvPr id="3" name="Content Placeholder 2"/>
-          <p:cNvSpPr>
-            <a:spLocks noGrp="1"/>
-          </p:cNvSpPr>
-          <p:nvPr>
-            <p:ph idx="1"/>
-          </p:nvPr>
-        </p:nvSpPr>
-        <p:spPr/>
-        <p:txBody>
-          <a:bodyPr/>
-          <a:lstStyle/>
-          <a:p>
-            <a:r>
-              <a:rPr lang="en-AU" dirty="0" smtClean="0"/>
-              <a:t>Save </a:t>
-            </a:r>
-            <a:r>
-              <a:rPr lang="en-AU" dirty="0" err="1" smtClean="0"/>
-              <a:t>GameObjects</a:t>
-            </a:r>
-            <a:r>
-              <a:rPr lang="en-AU" dirty="0" smtClean="0"/>
-              <a:t> as templates for quick creation at Runtime</a:t>
-            </a:r>
-          </a:p>
-          <a:p>
-            <a:r>
-              <a:rPr lang="en-AU" dirty="0" smtClean="0"/>
-              <a:t>Re-use object designs</a:t>
-            </a:r>
-            <a:endParaRPr lang="en-AU" dirty="0"/>
-          </a:p>
-          <a:p>
-            <a:r>
-              <a:rPr lang="en-AU" dirty="0" smtClean="0"/>
-              <a:t>Drag object to Project view </a:t>
-            </a:r>
-            <a:r>
-              <a:rPr lang="en-AU" smtClean="0"/>
-              <a:t>to create</a:t>
-            </a:r>
-            <a:endParaRPr lang="en-AU" dirty="0" smtClean="0"/>
+          <p:cNvPr id="5" name="Text Placeholder 4"/>
+          <p:cNvSpPr>
+            <a:spLocks noGrp="1"/>
+          </p:cNvSpPr>
+          <p:nvPr>
+            <p:ph type="body" idx="1"/>
+          </p:nvPr>
+        </p:nvSpPr>
+        <p:spPr/>
+        <p:txBody>
+          <a:bodyPr/>
+          <a:lstStyle/>
+          <a:p>
+            <a:endParaRPr lang="en-AU"/>
           </a:p>
         </p:txBody>
       </p:sp>
     </p:spTree>
     <p:extLst>
       <p:ext uri="{BB962C8B-B14F-4D97-AF65-F5344CB8AC3E}">
-        <p14:creationId xmlns:p14="http://schemas.microsoft.com/office/powerpoint/2010/main" val="346306987"/>
+        <p14:creationId xmlns:p14="http://schemas.microsoft.com/office/powerpoint/2010/main" val="2508853452"/>
       </p:ext>
     </p:extLst>
   </p:cSld>
@@ -5115,7 +5133,7 @@
           <a:p>
             <a:r>
               <a:rPr lang="en-AU" dirty="0" smtClean="0"/>
-              <a:t>Assets</a:t>
+              <a:t>Prefabs</a:t>
             </a:r>
             <a:endParaRPr lang="en-AU" dirty="0"/>
           </a:p>
@@ -5138,45 +5156,41 @@
           <a:p>
             <a:r>
               <a:rPr lang="en-AU" dirty="0" smtClean="0"/>
-              <a:t>Unity handles many formats</a:t>
-            </a:r>
-          </a:p>
-          <a:p>
-            <a:r>
-              <a:rPr lang="en-AU" dirty="0" smtClean="0"/>
-              <a:t>Images</a:t>
-            </a:r>
-          </a:p>
-          <a:p>
-            <a:r>
-              <a:rPr lang="en-AU" dirty="0" smtClean="0"/>
-              <a:t>Models</a:t>
-            </a:r>
-          </a:p>
-          <a:p>
-            <a:r>
-              <a:rPr lang="en-AU" dirty="0" smtClean="0"/>
-              <a:t>Audio</a:t>
-            </a:r>
-          </a:p>
-          <a:p>
-            <a:r>
-              <a:rPr lang="en-AU" dirty="0" smtClean="0"/>
-              <a:t>Place in project folder and boom</a:t>
-            </a:r>
-          </a:p>
-          <a:p>
-            <a:r>
-              <a:rPr lang="en-AU" dirty="0" smtClean="0"/>
-              <a:t>Configure in editor depending on file type</a:t>
-            </a:r>
+              <a:t>Save </a:t>
+            </a:r>
+            <a:r>
+              <a:rPr lang="en-AU" dirty="0" err="1" smtClean="0"/>
+              <a:t>GameObjects</a:t>
+            </a:r>
+            <a:r>
+              <a:rPr lang="en-AU" dirty="0" smtClean="0"/>
+              <a:t> as templates for quick creation at Runtime</a:t>
+            </a:r>
+          </a:p>
+          <a:p>
+            <a:r>
+              <a:rPr lang="en-AU" dirty="0" smtClean="0"/>
+              <a:t>Re-use object designs</a:t>
+            </a:r>
+            <a:endParaRPr lang="en-AU" dirty="0"/>
+          </a:p>
+          <a:p>
+            <a:r>
+              <a:rPr lang="en-AU" dirty="0" smtClean="0"/>
+              <a:t>Drag object to Project view </a:t>
+            </a:r>
+            <a:r>
+              <a:rPr lang="en-AU" smtClean="0"/>
+              <a:t>to create</a:t>
+            </a:r>
+            <a:endParaRPr lang="en-AU" dirty="0" smtClean="0"/>
           </a:p>
         </p:txBody>
       </p:sp>
     </p:spTree>
     <p:extLst>
       <p:ext uri="{BB962C8B-B14F-4D97-AF65-F5344CB8AC3E}">
-        <p14:creationId xmlns:p14="http://schemas.microsoft.com/office/powerpoint/2010/main" val="1645592049"/>
+        <p14:creationId xmlns:p14="http://schemas.microsoft.com/office/powerpoint/2010/main" val="346306987"/>
       </p:ext>
     </p:extLst>
   </p:cSld>
@@ -5205,7 +5219,7 @@
       </p:grpSpPr>
       <p:sp>
         <p:nvSpPr>
-          <p:cNvPr id="4" name="Title 3"/>
+          <p:cNvPr id="2" name="Title 1"/>
           <p:cNvSpPr>
             <a:spLocks noGrp="1"/>
           </p:cNvSpPr>
@@ -5220,7 +5234,7 @@
           <a:p>
             <a:r>
               <a:rPr lang="en-AU" dirty="0" smtClean="0"/>
-              <a:t>Sub-Systems</a:t>
+              <a:t>Assets</a:t>
             </a:r>
             <a:endParaRPr lang="en-AU" dirty="0"/>
           </a:p>
@@ -5228,31 +5242,60 @@
       </p:sp>
       <p:sp>
         <p:nvSpPr>
-          <p:cNvPr id="5" name="Text Placeholder 4"/>
-          <p:cNvSpPr>
-            <a:spLocks noGrp="1"/>
-          </p:cNvSpPr>
-          <p:nvPr>
-            <p:ph type="body" idx="1"/>
-          </p:nvPr>
-        </p:nvSpPr>
-        <p:spPr/>
-        <p:txBody>
-          <a:bodyPr/>
-          <a:lstStyle/>
-          <a:p>
-            <a:r>
-              <a:rPr lang="en-AU" dirty="0" smtClean="0"/>
-              <a:t>What goes into a game?</a:t>
-            </a:r>
-            <a:endParaRPr lang="en-AU" dirty="0"/>
+          <p:cNvPr id="3" name="Content Placeholder 2"/>
+          <p:cNvSpPr>
+            <a:spLocks noGrp="1"/>
+          </p:cNvSpPr>
+          <p:nvPr>
+            <p:ph idx="1"/>
+          </p:nvPr>
+        </p:nvSpPr>
+        <p:spPr/>
+        <p:txBody>
+          <a:bodyPr/>
+          <a:lstStyle/>
+          <a:p>
+            <a:r>
+              <a:rPr lang="en-AU" dirty="0" smtClean="0"/>
+              <a:t>Unity handles many formats</a:t>
+            </a:r>
+          </a:p>
+          <a:p>
+            <a:r>
+              <a:rPr lang="en-AU" dirty="0" smtClean="0"/>
+              <a:t>Images</a:t>
+            </a:r>
+          </a:p>
+          <a:p>
+            <a:r>
+              <a:rPr lang="en-AU" dirty="0" smtClean="0"/>
+              <a:t>Models</a:t>
+            </a:r>
+          </a:p>
+          <a:p>
+            <a:r>
+              <a:rPr lang="en-AU" dirty="0" smtClean="0"/>
+              <a:t>Audio</a:t>
+            </a:r>
+          </a:p>
+          <a:p>
+            <a:r>
+              <a:rPr lang="en-AU" dirty="0" smtClean="0"/>
+              <a:t>Place in project folder and boom</a:t>
+            </a:r>
+          </a:p>
+          <a:p>
+            <a:r>
+              <a:rPr lang="en-AU" dirty="0" smtClean="0"/>
+              <a:t>Configure in editor depending on file type</a:t>
+            </a:r>
           </a:p>
         </p:txBody>
       </p:sp>
     </p:spTree>
     <p:extLst>
       <p:ext uri="{BB962C8B-B14F-4D97-AF65-F5344CB8AC3E}">
-        <p14:creationId xmlns:p14="http://schemas.microsoft.com/office/powerpoint/2010/main" val="2720192471"/>
+        <p14:creationId xmlns:p14="http://schemas.microsoft.com/office/powerpoint/2010/main" val="1645592049"/>
       </p:ext>
     </p:extLst>
   </p:cSld>
@@ -5281,7 +5324,7 @@
       </p:grpSpPr>
       <p:sp>
         <p:nvSpPr>
-          <p:cNvPr id="2" name="Title 1"/>
+          <p:cNvPr id="4" name="Title 3"/>
           <p:cNvSpPr>
             <a:spLocks noGrp="1"/>
           </p:cNvSpPr>
@@ -5296,7 +5339,7 @@
           <a:p>
             <a:r>
               <a:rPr lang="en-AU" dirty="0" smtClean="0"/>
-              <a:t>3D Rendering</a:t>
+              <a:t>Sub-Systems</a:t>
             </a:r>
             <a:endParaRPr lang="en-AU" dirty="0"/>
           </a:p>
@@ -5304,85 +5347,31 @@
       </p:sp>
       <p:sp>
         <p:nvSpPr>
-          <p:cNvPr id="3" name="Content Placeholder 2"/>
-          <p:cNvSpPr>
-            <a:spLocks noGrp="1"/>
-          </p:cNvSpPr>
-          <p:nvPr>
-            <p:ph idx="1"/>
-          </p:nvPr>
-        </p:nvSpPr>
-        <p:spPr/>
-        <p:txBody>
-          <a:bodyPr/>
-          <a:lstStyle/>
-          <a:p>
-            <a:r>
-              <a:rPr lang="en-AU" dirty="0" smtClean="0"/>
-              <a:t>Mesh Filter</a:t>
-            </a:r>
-          </a:p>
-          <a:p>
-            <a:pPr lvl="1"/>
-            <a:r>
-              <a:rPr lang="en-AU" dirty="0" smtClean="0"/>
-              <a:t>The Mesh Data</a:t>
-            </a:r>
-          </a:p>
-          <a:p>
-            <a:r>
-              <a:rPr lang="en-AU" dirty="0" smtClean="0"/>
-              <a:t>Material</a:t>
-            </a:r>
-          </a:p>
-          <a:p>
-            <a:pPr lvl="1"/>
-            <a:r>
-              <a:rPr lang="en-AU" dirty="0" smtClean="0"/>
-              <a:t>More on this in Part 2</a:t>
-            </a:r>
-          </a:p>
-          <a:p>
-            <a:r>
-              <a:rPr lang="en-AU" dirty="0" smtClean="0"/>
-              <a:t>Mesh Renderer</a:t>
-            </a:r>
-          </a:p>
-          <a:p>
-            <a:pPr lvl="1"/>
-            <a:r>
-              <a:rPr lang="en-AU" dirty="0" smtClean="0"/>
-              <a:t>Binds Filter + Material and Draws</a:t>
-            </a:r>
-          </a:p>
-          <a:p>
-            <a:r>
-              <a:rPr lang="en-AU" dirty="0" smtClean="0"/>
-              <a:t>Unity generates a prefab from an imported model</a:t>
-            </a:r>
-          </a:p>
-          <a:p>
-            <a:r>
-              <a:rPr lang="en-AU" dirty="0" smtClean="0"/>
-              <a:t>Animator</a:t>
-            </a:r>
-          </a:p>
-          <a:p>
-            <a:pPr lvl="1"/>
-            <a:r>
-              <a:rPr lang="en-AU" dirty="0" smtClean="0"/>
-              <a:t>Not covered</a:t>
-            </a:r>
-          </a:p>
-          <a:p>
-            <a:endParaRPr lang="en-AU" dirty="0" smtClean="0"/>
+          <p:cNvPr id="5" name="Text Placeholder 4"/>
+          <p:cNvSpPr>
+            <a:spLocks noGrp="1"/>
+          </p:cNvSpPr>
+          <p:nvPr>
+            <p:ph type="body" idx="1"/>
+          </p:nvPr>
+        </p:nvSpPr>
+        <p:spPr/>
+        <p:txBody>
+          <a:bodyPr/>
+          <a:lstStyle/>
+          <a:p>
+            <a:r>
+              <a:rPr lang="en-AU" dirty="0" smtClean="0"/>
+              <a:t>What goes into a game?</a:t>
+            </a:r>
+            <a:endParaRPr lang="en-AU" dirty="0"/>
           </a:p>
         </p:txBody>
       </p:sp>
     </p:spTree>
     <p:extLst>
       <p:ext uri="{BB962C8B-B14F-4D97-AF65-F5344CB8AC3E}">
-        <p14:creationId xmlns:p14="http://schemas.microsoft.com/office/powerpoint/2010/main" val="2580776966"/>
+        <p14:creationId xmlns:p14="http://schemas.microsoft.com/office/powerpoint/2010/main" val="2720192471"/>
       </p:ext>
     </p:extLst>
   </p:cSld>
@@ -5579,7 +5568,7 @@
           <a:p>
             <a:r>
               <a:rPr lang="en-AU" dirty="0" smtClean="0"/>
-              <a:t>Input</a:t>
+              <a:t>3D Rendering</a:t>
             </a:r>
             <a:endParaRPr lang="en-AU" dirty="0"/>
           </a:p>
@@ -5602,57 +5591,70 @@
           <a:p>
             <a:r>
               <a:rPr lang="en-AU" dirty="0" smtClean="0"/>
-              <a:t>Hardcoded</a:t>
+              <a:t>Mesh Filter</a:t>
             </a:r>
           </a:p>
           <a:p>
             <a:pPr lvl="1"/>
             <a:r>
               <a:rPr lang="en-AU" dirty="0" smtClean="0"/>
-              <a:t>Check individual keys in code</a:t>
+              <a:t>The Mesh Data</a:t>
+            </a:r>
+          </a:p>
+          <a:p>
+            <a:r>
+              <a:rPr lang="en-AU" dirty="0" smtClean="0"/>
+              <a:t>Material</a:t>
             </a:r>
           </a:p>
           <a:p>
             <a:pPr lvl="1"/>
             <a:r>
               <a:rPr lang="en-AU" dirty="0" smtClean="0"/>
-              <a:t>You handle configuration or multiple input types</a:t>
-            </a:r>
-          </a:p>
-          <a:p>
-            <a:r>
-              <a:rPr lang="en-AU" dirty="0" smtClean="0"/>
-              <a:t>Configurable</a:t>
+              <a:t>More on this in Part 2</a:t>
+            </a:r>
+          </a:p>
+          <a:p>
+            <a:r>
+              <a:rPr lang="en-AU" dirty="0" smtClean="0"/>
+              <a:t>Mesh Renderer</a:t>
             </a:r>
           </a:p>
           <a:p>
             <a:pPr lvl="1"/>
             <a:r>
               <a:rPr lang="en-AU" dirty="0" smtClean="0"/>
-              <a:t>Check if a named input has been triggered</a:t>
+              <a:t>Binds Filter + Material and Draws</a:t>
+            </a:r>
+          </a:p>
+          <a:p>
+            <a:r>
+              <a:rPr lang="en-AU" dirty="0" smtClean="0"/>
+              <a:t>Unity generates a prefab from an imported model</a:t>
+            </a:r>
+          </a:p>
+          <a:p>
+            <a:r>
+              <a:rPr lang="en-AU" dirty="0" smtClean="0"/>
+              <a:t>Animator</a:t>
             </a:r>
           </a:p>
           <a:p>
             <a:pPr lvl="1"/>
             <a:r>
               <a:rPr lang="en-AU" dirty="0" smtClean="0"/>
-              <a:t>Define these inputs in the Unity Editor</a:t>
-            </a:r>
-          </a:p>
-          <a:p>
-            <a:pPr lvl="1"/>
-            <a:r>
-              <a:rPr lang="en-AU" dirty="0" smtClean="0"/>
-              <a:t>Allows for multiple input types</a:t>
-            </a:r>
-            <a:endParaRPr lang="en-AU" dirty="0"/>
+              <a:t>Not covered</a:t>
+            </a:r>
+          </a:p>
+          <a:p>
+            <a:endParaRPr lang="en-AU" dirty="0" smtClean="0"/>
           </a:p>
         </p:txBody>
       </p:sp>
     </p:spTree>
     <p:extLst>
       <p:ext uri="{BB962C8B-B14F-4D97-AF65-F5344CB8AC3E}">
-        <p14:creationId xmlns:p14="http://schemas.microsoft.com/office/powerpoint/2010/main" val="908806141"/>
+        <p14:creationId xmlns:p14="http://schemas.microsoft.com/office/powerpoint/2010/main" val="2580776966"/>
       </p:ext>
     </p:extLst>
   </p:cSld>
@@ -5696,7 +5698,7 @@
           <a:p>
             <a:r>
               <a:rPr lang="en-AU" dirty="0" smtClean="0"/>
-              <a:t>Input - Hardcoded</a:t>
+              <a:t>Input</a:t>
             </a:r>
             <a:endParaRPr lang="en-AU" dirty="0"/>
           </a:p>
@@ -5718,110 +5720,58 @@
           <a:lstStyle/>
           <a:p>
             <a:r>
-              <a:rPr lang="en-AU" dirty="0" err="1" smtClean="0"/>
-              <a:t>Input.GetKey</a:t>
-            </a:r>
-            <a:r>
-              <a:rPr lang="en-AU" dirty="0" smtClean="0"/>
-              <a:t>()</a:t>
+              <a:rPr lang="en-AU" dirty="0" smtClean="0"/>
+              <a:t>Hardcoded</a:t>
             </a:r>
           </a:p>
           <a:p>
             <a:pPr lvl="1"/>
             <a:r>
-              <a:rPr lang="en-AU" dirty="0" err="1" smtClean="0"/>
-              <a:t>GetKeyDown</a:t>
-            </a:r>
-            <a:r>
-              <a:rPr lang="en-AU" dirty="0" smtClean="0"/>
-              <a:t>/Up()</a:t>
+              <a:rPr lang="en-AU" dirty="0" smtClean="0"/>
+              <a:t>Check individual keys in code</a:t>
+            </a:r>
+          </a:p>
+          <a:p>
+            <a:pPr lvl="1"/>
+            <a:r>
+              <a:rPr lang="en-AU" dirty="0" smtClean="0"/>
+              <a:t>You handle configuration or multiple input types</a:t>
+            </a:r>
+          </a:p>
+          <a:p>
+            <a:r>
+              <a:rPr lang="en-AU" dirty="0" smtClean="0"/>
+              <a:t>Configurable</a:t>
+            </a:r>
+          </a:p>
+          <a:p>
+            <a:pPr lvl="1"/>
+            <a:r>
+              <a:rPr lang="en-AU" dirty="0" smtClean="0"/>
+              <a:t>Check if a named input has been triggered</a:t>
+            </a:r>
+          </a:p>
+          <a:p>
+            <a:pPr lvl="1"/>
+            <a:r>
+              <a:rPr lang="en-AU" dirty="0" smtClean="0"/>
+              <a:t>Define these inputs in the Unity Editor</a:t>
+            </a:r>
+          </a:p>
+          <a:p>
+            <a:pPr lvl="1"/>
+            <a:r>
+              <a:rPr lang="en-AU" dirty="0" smtClean="0"/>
+              <a:t>Allows for multiple input types</a:t>
             </a:r>
             <a:endParaRPr lang="en-AU" dirty="0"/>
-          </a:p>
-          <a:p>
-            <a:r>
-              <a:rPr lang="en-AU" dirty="0" err="1" smtClean="0"/>
-              <a:t>Input.GetMouseButton</a:t>
-            </a:r>
-            <a:r>
-              <a:rPr lang="en-AU" dirty="0" smtClean="0"/>
-              <a:t>()</a:t>
-            </a:r>
-          </a:p>
-          <a:p>
-            <a:pPr lvl="1"/>
-            <a:r>
-              <a:rPr lang="en-AU" dirty="0" err="1" smtClean="0"/>
-              <a:t>GetMouseButtonDown</a:t>
-            </a:r>
-            <a:r>
-              <a:rPr lang="en-AU" dirty="0" smtClean="0"/>
-              <a:t>/Up()</a:t>
-            </a:r>
-          </a:p>
-          <a:p>
-            <a:r>
-              <a:rPr lang="en-AU" dirty="0" err="1" smtClean="0"/>
-              <a:t>Input.mousePosition</a:t>
-            </a:r>
-            <a:endParaRPr lang="en-AU" dirty="0" smtClean="0"/>
-          </a:p>
-          <a:p>
-            <a:r>
-              <a:rPr lang="en-AU" dirty="0" err="1" smtClean="0"/>
-              <a:t>Input.GetTouch</a:t>
-            </a:r>
-            <a:r>
-              <a:rPr lang="en-AU" dirty="0" smtClean="0"/>
-              <a:t>()</a:t>
-            </a:r>
-          </a:p>
-          <a:p>
-            <a:pPr lvl="1"/>
-            <a:r>
-              <a:rPr lang="en-AU" dirty="0" err="1" smtClean="0"/>
-              <a:t>Input.touchCount</a:t>
-            </a:r>
-            <a:endParaRPr lang="en-AU" dirty="0" smtClean="0"/>
-          </a:p>
-          <a:p>
-            <a:r>
-              <a:rPr lang="en-AU" dirty="0" err="1" smtClean="0"/>
-              <a:t>deviceOrientation</a:t>
-            </a:r>
-            <a:r>
-              <a:rPr lang="en-AU" dirty="0" smtClean="0"/>
-              <a:t>, gyro, compass, acceleration</a:t>
-            </a:r>
-          </a:p>
-          <a:p>
-            <a:pPr marL="0" indent="0">
-              <a:buNone/>
-            </a:pPr>
-            <a:r>
-              <a:rPr lang="en-AU" sz="1800" dirty="0">
-                <a:hlinkClick r:id="rId2"/>
-              </a:rPr>
-              <a:t>http://</a:t>
-            </a:r>
-            <a:r>
-              <a:rPr lang="en-AU" sz="1800" dirty="0" smtClean="0">
-                <a:hlinkClick r:id="rId2"/>
-              </a:rPr>
-              <a:t>docs.unity3d.com/Documentation/ScriptReference/Input.html</a:t>
-            </a:r>
-            <a:r>
-              <a:rPr lang="en-AU" sz="1800" dirty="0" smtClean="0"/>
-              <a:t> </a:t>
-            </a:r>
-            <a:endParaRPr lang="en-AU" sz="1800" dirty="0" smtClean="0"/>
           </a:p>
         </p:txBody>
       </p:sp>
     </p:spTree>
     <p:extLst>
       <p:ext uri="{BB962C8B-B14F-4D97-AF65-F5344CB8AC3E}">
-        <p14:creationId xmlns:p14="http://schemas.microsoft.com/office/powerpoint/2010/main" val="1130396208"/>
+        <p14:creationId xmlns:p14="http://schemas.microsoft.com/office/powerpoint/2010/main" val="908806141"/>
       </p:ext>
     </p:extLst>
   </p:cSld>
@@ -5865,7 +5815,7 @@
           <a:p>
             <a:r>
               <a:rPr lang="en-AU" dirty="0" smtClean="0"/>
-              <a:t>Input - Configurable</a:t>
+              <a:t>Input - Hardcoded</a:t>
             </a:r>
             <a:endParaRPr lang="en-AU" dirty="0"/>
           </a:p>
@@ -5873,50 +5823,123 @@
       </p:sp>
       <p:sp>
         <p:nvSpPr>
-          <p:cNvPr id="6" name="Content Placeholder 5"/>
-          <p:cNvSpPr>
-            <a:spLocks noGrp="1"/>
-          </p:cNvSpPr>
-          <p:nvPr>
-            <p:ph sz="half" idx="1"/>
-          </p:nvPr>
-        </p:nvSpPr>
-        <p:spPr/>
-        <p:txBody>
-          <a:bodyPr/>
-          <a:lstStyle/>
-          <a:p>
-            <a:endParaRPr lang="en-AU"/>
-          </a:p>
-        </p:txBody>
-      </p:sp>
-      <p:sp>
-        <p:nvSpPr>
-          <p:cNvPr id="7" name="Content Placeholder 6"/>
-          <p:cNvSpPr>
-            <a:spLocks noGrp="1"/>
-          </p:cNvSpPr>
-          <p:nvPr>
-            <p:ph sz="half" idx="2"/>
-          </p:nvPr>
-        </p:nvSpPr>
-        <p:spPr/>
-        <p:txBody>
-          <a:bodyPr/>
-          <a:lstStyle/>
-          <a:p>
-            <a:r>
-              <a:rPr lang="en-AU" dirty="0" smtClean="0"/>
-              <a:t>Image of Unity input editor goes here</a:t>
+          <p:cNvPr id="3" name="Content Placeholder 2"/>
+          <p:cNvSpPr>
+            <a:spLocks noGrp="1"/>
+          </p:cNvSpPr>
+          <p:nvPr>
+            <p:ph idx="1"/>
+          </p:nvPr>
+        </p:nvSpPr>
+        <p:spPr/>
+        <p:txBody>
+          <a:bodyPr/>
+          <a:lstStyle/>
+          <a:p>
+            <a:r>
+              <a:rPr lang="en-AU" dirty="0" err="1" smtClean="0"/>
+              <a:t>Input.GetKey</a:t>
+            </a:r>
+            <a:r>
+              <a:rPr lang="en-AU" dirty="0" smtClean="0"/>
+              <a:t>()</a:t>
+            </a:r>
+          </a:p>
+          <a:p>
+            <a:pPr lvl="1"/>
+            <a:r>
+              <a:rPr lang="en-AU" dirty="0" err="1" smtClean="0"/>
+              <a:t>GetKeyDown</a:t>
+            </a:r>
+            <a:r>
+              <a:rPr lang="en-AU" dirty="0" smtClean="0"/>
+              <a:t>/Up()</a:t>
             </a:r>
             <a:endParaRPr lang="en-AU" dirty="0"/>
+          </a:p>
+          <a:p>
+            <a:r>
+              <a:rPr lang="en-AU" dirty="0" err="1" smtClean="0"/>
+              <a:t>Input.GetMouseButton</a:t>
+            </a:r>
+            <a:r>
+              <a:rPr lang="en-AU" dirty="0" smtClean="0"/>
+              <a:t>()</a:t>
+            </a:r>
+          </a:p>
+          <a:p>
+            <a:pPr lvl="1"/>
+            <a:r>
+              <a:rPr lang="en-AU" dirty="0" err="1" smtClean="0"/>
+              <a:t>GetMouseButtonDown</a:t>
+            </a:r>
+            <a:r>
+              <a:rPr lang="en-AU" dirty="0" smtClean="0"/>
+              <a:t>/Up()</a:t>
+            </a:r>
+          </a:p>
+          <a:p>
+            <a:r>
+              <a:rPr lang="en-AU" dirty="0" err="1" smtClean="0"/>
+              <a:t>Input.mousePosition</a:t>
+            </a:r>
+            <a:endParaRPr lang="en-AU" dirty="0" smtClean="0"/>
+          </a:p>
+          <a:p>
+            <a:r>
+              <a:rPr lang="en-AU" dirty="0" err="1" smtClean="0"/>
+              <a:t>Input.GetTouch</a:t>
+            </a:r>
+            <a:r>
+              <a:rPr lang="en-AU" dirty="0" smtClean="0"/>
+              <a:t>()</a:t>
+            </a:r>
+          </a:p>
+          <a:p>
+            <a:pPr lvl="1"/>
+            <a:r>
+              <a:rPr lang="en-AU" dirty="0" err="1" smtClean="0"/>
+              <a:t>Input.touchCount</a:t>
+            </a:r>
+            <a:endParaRPr lang="en-AU" dirty="0" smtClean="0"/>
+          </a:p>
+          <a:p>
+            <a:r>
+              <a:rPr lang="en-AU" dirty="0" err="1" smtClean="0"/>
+              <a:t>deviceOrientation</a:t>
+            </a:r>
+            <a:r>
+              <a:rPr lang="en-AU" dirty="0" smtClean="0"/>
+              <a:t>, gyro, compass, acceleration</a:t>
+            </a:r>
+          </a:p>
+          <a:p>
+            <a:pPr marL="0" indent="0">
+              <a:buNone/>
+            </a:pPr>
+            <a:r>
+              <a:rPr lang="en-AU" sz="1800" dirty="0">
+                <a:hlinkClick r:id="rId2"/>
+              </a:rPr>
+              <a:t>http://</a:t>
+            </a:r>
+            <a:r>
+              <a:rPr lang="en-AU" sz="1800" dirty="0" smtClean="0">
+                <a:hlinkClick r:id="rId2"/>
+              </a:rPr>
+              <a:t>docs.unity3d.com/Documentation/ScriptReference/Input.html</a:t>
+            </a:r>
+            <a:r>
+              <a:rPr lang="en-AU" sz="1800" dirty="0" smtClean="0"/>
+              <a:t> </a:t>
+            </a:r>
           </a:p>
         </p:txBody>
       </p:sp>
     </p:spTree>
     <p:extLst>
       <p:ext uri="{BB962C8B-B14F-4D97-AF65-F5344CB8AC3E}">
-        <p14:creationId xmlns:p14="http://schemas.microsoft.com/office/powerpoint/2010/main" val="4052783222"/>
+        <p14:creationId xmlns:p14="http://schemas.microsoft.com/office/powerpoint/2010/main" val="1130396208"/>
       </p:ext>
     </p:extLst>
   </p:cSld>
@@ -5968,27 +5991,50 @@
       </p:sp>
       <p:sp>
         <p:nvSpPr>
-          <p:cNvPr id="3" name="Content Placeholder 2"/>
-          <p:cNvSpPr>
-            <a:spLocks noGrp="1"/>
-          </p:cNvSpPr>
-          <p:nvPr>
-            <p:ph idx="1"/>
-          </p:nvPr>
-        </p:nvSpPr>
-        <p:spPr/>
-        <p:txBody>
-          <a:bodyPr/>
-          <a:lstStyle/>
-          <a:p>
-            <a:endParaRPr lang="en-AU"/>
+          <p:cNvPr id="6" name="Content Placeholder 5"/>
+          <p:cNvSpPr>
+            <a:spLocks noGrp="1"/>
+          </p:cNvSpPr>
+          <p:nvPr>
+            <p:ph sz="half" idx="1"/>
+          </p:nvPr>
+        </p:nvSpPr>
+        <p:spPr/>
+        <p:txBody>
+          <a:bodyPr/>
+          <a:lstStyle/>
+          <a:p>
+            <a:endParaRPr lang="en-AU"/>
+          </a:p>
+        </p:txBody>
+      </p:sp>
+      <p:sp>
+        <p:nvSpPr>
+          <p:cNvPr id="7" name="Content Placeholder 6"/>
+          <p:cNvSpPr>
+            <a:spLocks noGrp="1"/>
+          </p:cNvSpPr>
+          <p:nvPr>
+            <p:ph sz="half" idx="2"/>
+          </p:nvPr>
+        </p:nvSpPr>
+        <p:spPr/>
+        <p:txBody>
+          <a:bodyPr/>
+          <a:lstStyle/>
+          <a:p>
+            <a:r>
+              <a:rPr lang="en-AU" dirty="0" smtClean="0"/>
+              <a:t>Image of Unity input editor goes here</a:t>
+            </a:r>
+            <a:endParaRPr lang="en-AU" dirty="0"/>
           </a:p>
         </p:txBody>
       </p:sp>
     </p:spTree>
     <p:extLst>
       <p:ext uri="{BB962C8B-B14F-4D97-AF65-F5344CB8AC3E}">
-        <p14:creationId xmlns:p14="http://schemas.microsoft.com/office/powerpoint/2010/main" val="2007838317"/>
+        <p14:creationId xmlns:p14="http://schemas.microsoft.com/office/powerpoint/2010/main" val="4052783222"/>
       </p:ext>
     </p:extLst>
   </p:cSld>
@@ -6032,7 +6078,7 @@
           <a:p>
             <a:r>
               <a:rPr lang="en-AU" dirty="0" smtClean="0"/>
-              <a:t>Physics</a:t>
+              <a:t>Input - Configurable</a:t>
             </a:r>
             <a:endParaRPr lang="en-AU" dirty="0"/>
           </a:p>
@@ -6060,7 +6106,7 @@
     </p:spTree>
     <p:extLst>
       <p:ext uri="{BB962C8B-B14F-4D97-AF65-F5344CB8AC3E}">
-        <p14:creationId xmlns:p14="http://schemas.microsoft.com/office/powerpoint/2010/main" val="67478454"/>
+        <p14:creationId xmlns:p14="http://schemas.microsoft.com/office/powerpoint/2010/main" val="2007838317"/>
       </p:ext>
     </p:extLst>
   </p:cSld>
@@ -6104,7 +6150,7 @@
           <a:p>
             <a:r>
               <a:rPr lang="en-AU" dirty="0" smtClean="0"/>
-              <a:t>Let’s Make a Game</a:t>
+              <a:t>Physics</a:t>
             </a:r>
             <a:endParaRPr lang="en-AU" dirty="0"/>
           </a:p>
@@ -6112,31 +6158,27 @@
       </p:sp>
       <p:sp>
         <p:nvSpPr>
-          <p:cNvPr id="4" name="Text Placeholder 3"/>
-          <p:cNvSpPr>
-            <a:spLocks noGrp="1"/>
-          </p:cNvSpPr>
-          <p:nvPr>
-            <p:ph type="body" idx="1"/>
-          </p:nvPr>
-        </p:nvSpPr>
-        <p:spPr/>
-        <p:txBody>
-          <a:bodyPr/>
-          <a:lstStyle/>
-          <a:p>
-            <a:r>
-              <a:rPr lang="en-AU" dirty="0" smtClean="0"/>
-              <a:t>Breakout</a:t>
-            </a:r>
-            <a:endParaRPr lang="en-AU" dirty="0"/>
+          <p:cNvPr id="3" name="Content Placeholder 2"/>
+          <p:cNvSpPr>
+            <a:spLocks noGrp="1"/>
+          </p:cNvSpPr>
+          <p:nvPr>
+            <p:ph idx="1"/>
+          </p:nvPr>
+        </p:nvSpPr>
+        <p:spPr/>
+        <p:txBody>
+          <a:bodyPr/>
+          <a:lstStyle/>
+          <a:p>
+            <a:endParaRPr lang="en-AU"/>
           </a:p>
         </p:txBody>
       </p:sp>
     </p:spTree>
     <p:extLst>
       <p:ext uri="{BB962C8B-B14F-4D97-AF65-F5344CB8AC3E}">
-        <p14:creationId xmlns:p14="http://schemas.microsoft.com/office/powerpoint/2010/main" val="783920217"/>
+        <p14:creationId xmlns:p14="http://schemas.microsoft.com/office/powerpoint/2010/main" val="67478454"/>
       </p:ext>
     </p:extLst>
   </p:cSld>
@@ -6180,7 +6222,7 @@
           <a:p>
             <a:r>
               <a:rPr lang="en-AU" dirty="0" smtClean="0"/>
-              <a:t>The Windows Store</a:t>
+              <a:t>Let’s Make a Game</a:t>
             </a:r>
             <a:endParaRPr lang="en-AU" dirty="0"/>
           </a:p>
@@ -6188,7 +6230,7 @@
       </p:sp>
       <p:sp>
         <p:nvSpPr>
-          <p:cNvPr id="3" name="Text Placeholder 2"/>
+          <p:cNvPr id="4" name="Text Placeholder 3"/>
           <p:cNvSpPr>
             <a:spLocks noGrp="1"/>
           </p:cNvSpPr>
@@ -6203,7 +6245,7 @@
           <a:p>
             <a:r>
               <a:rPr lang="en-AU" dirty="0" smtClean="0"/>
-              <a:t>Building and Certification</a:t>
+              <a:t>Breakout</a:t>
             </a:r>
             <a:endParaRPr lang="en-AU" dirty="0"/>
           </a:p>
@@ -6212,7 +6254,7 @@
     </p:spTree>
     <p:extLst>
       <p:ext uri="{BB962C8B-B14F-4D97-AF65-F5344CB8AC3E}">
-        <p14:creationId xmlns:p14="http://schemas.microsoft.com/office/powerpoint/2010/main" val="86343519"/>
+        <p14:creationId xmlns:p14="http://schemas.microsoft.com/office/powerpoint/2010/main" val="783920217"/>
       </p:ext>
     </p:extLst>
   </p:cSld>
@@ -6241,7 +6283,7 @@
       </p:grpSpPr>
       <p:sp>
         <p:nvSpPr>
-          <p:cNvPr id="4" name="Title 3"/>
+          <p:cNvPr id="2" name="Title 1"/>
           <p:cNvSpPr>
             <a:spLocks noGrp="1"/>
           </p:cNvSpPr>
@@ -6256,7 +6298,7 @@
           <a:p>
             <a:r>
               <a:rPr lang="en-AU" dirty="0" smtClean="0"/>
-              <a:t>XAML</a:t>
+              <a:t>The Windows Store</a:t>
             </a:r>
             <a:endParaRPr lang="en-AU" dirty="0"/>
           </a:p>
@@ -6264,27 +6306,31 @@
       </p:sp>
       <p:sp>
         <p:nvSpPr>
-          <p:cNvPr id="5" name="Content Placeholder 4"/>
-          <p:cNvSpPr>
-            <a:spLocks noGrp="1"/>
-          </p:cNvSpPr>
-          <p:nvPr>
-            <p:ph idx="1"/>
-          </p:nvPr>
-        </p:nvSpPr>
-        <p:spPr/>
-        <p:txBody>
-          <a:bodyPr/>
-          <a:lstStyle/>
-          <a:p>
-            <a:endParaRPr lang="en-AU"/>
+          <p:cNvPr id="3" name="Text Placeholder 2"/>
+          <p:cNvSpPr>
+            <a:spLocks noGrp="1"/>
+          </p:cNvSpPr>
+          <p:nvPr>
+            <p:ph type="body" idx="1"/>
+          </p:nvPr>
+        </p:nvSpPr>
+        <p:spPr/>
+        <p:txBody>
+          <a:bodyPr/>
+          <a:lstStyle/>
+          <a:p>
+            <a:r>
+              <a:rPr lang="en-AU" dirty="0" smtClean="0"/>
+              <a:t>Building and Certification</a:t>
+            </a:r>
+            <a:endParaRPr lang="en-AU" dirty="0"/>
           </a:p>
         </p:txBody>
       </p:sp>
     </p:spTree>
     <p:extLst>
       <p:ext uri="{BB962C8B-B14F-4D97-AF65-F5344CB8AC3E}">
-        <p14:creationId xmlns:p14="http://schemas.microsoft.com/office/powerpoint/2010/main" val="3121308789"/>
+        <p14:creationId xmlns:p14="http://schemas.microsoft.com/office/powerpoint/2010/main" val="86343519"/>
       </p:ext>
     </p:extLst>
   </p:cSld>
@@ -6313,7 +6359,7 @@
       </p:grpSpPr>
       <p:sp>
         <p:nvSpPr>
-          <p:cNvPr id="2" name="Title 1"/>
+          <p:cNvPr id="4" name="Title 3"/>
           <p:cNvSpPr>
             <a:spLocks noGrp="1"/>
           </p:cNvSpPr>
@@ -6327,12 +6373,8 @@
           <a:lstStyle/>
           <a:p>
             <a:r>
-              <a:rPr lang="en-AU" dirty="0" err="1" smtClean="0"/>
-              <a:t>WinRT</a:t>
-            </a:r>
-            <a:r>
-              <a:rPr lang="en-AU" dirty="0" smtClean="0"/>
-              <a:t> and Compiling for the Store</a:t>
+              <a:rPr lang="en-AU" dirty="0" smtClean="0"/>
+              <a:t>XAML</a:t>
             </a:r>
             <a:endParaRPr lang="en-AU" dirty="0"/>
           </a:p>
@@ -6340,7 +6382,7 @@
       </p:sp>
       <p:sp>
         <p:nvSpPr>
-          <p:cNvPr id="3" name="Content Placeholder 2"/>
+          <p:cNvPr id="5" name="Content Placeholder 4"/>
           <p:cNvSpPr>
             <a:spLocks noGrp="1"/>
           </p:cNvSpPr>
@@ -6360,7 +6402,7 @@
     </p:spTree>
     <p:extLst>
       <p:ext uri="{BB962C8B-B14F-4D97-AF65-F5344CB8AC3E}">
-        <p14:creationId xmlns:p14="http://schemas.microsoft.com/office/powerpoint/2010/main" val="1811821516"/>
+        <p14:creationId xmlns:p14="http://schemas.microsoft.com/office/powerpoint/2010/main" val="3121308789"/>
       </p:ext>
     </p:extLst>
   </p:cSld>
@@ -6403,12 +6445,12 @@
           <a:lstStyle/>
           <a:p>
             <a:r>
-              <a:rPr lang="en-AU" dirty="0" smtClean="0"/>
-              <a:t>Debugging Scripts with </a:t>
-            </a:r>
-            <a:r>
               <a:rPr lang="en-AU" dirty="0" err="1" smtClean="0"/>
               <a:t>WinRT</a:t>
+            </a:r>
+            <a:r>
+              <a:rPr lang="en-AU" dirty="0" smtClean="0"/>
+              <a:t> and Compiling for the Store</a:t>
             </a:r>
             <a:endParaRPr lang="en-AU" dirty="0"/>
           </a:p>
@@ -6436,7 +6478,7 @@
     </p:spTree>
     <p:extLst>
       <p:ext uri="{BB962C8B-B14F-4D97-AF65-F5344CB8AC3E}">
-        <p14:creationId xmlns:p14="http://schemas.microsoft.com/office/powerpoint/2010/main" val="2619712675"/>
+        <p14:creationId xmlns:p14="http://schemas.microsoft.com/office/powerpoint/2010/main" val="1811821516"/>
       </p:ext>
     </p:extLst>
   </p:cSld>
@@ -6599,8 +6641,12 @@
           <a:lstStyle/>
           <a:p>
             <a:r>
+              <a:rPr lang="en-AU" dirty="0" smtClean="0"/>
+              <a:t>Debugging Scripts with </a:t>
+            </a:r>
+            <a:r>
               <a:rPr lang="en-AU" dirty="0" err="1" smtClean="0"/>
-              <a:t>UnityEngine.WSA</a:t>
+              <a:t>WinRT</a:t>
             </a:r>
             <a:endParaRPr lang="en-AU" dirty="0"/>
           </a:p>
@@ -6628,7 +6674,7 @@
     </p:spTree>
     <p:extLst>
       <p:ext uri="{BB962C8B-B14F-4D97-AF65-F5344CB8AC3E}">
-        <p14:creationId xmlns:p14="http://schemas.microsoft.com/office/powerpoint/2010/main" val="357982477"/>
+        <p14:creationId xmlns:p14="http://schemas.microsoft.com/office/powerpoint/2010/main" val="2619712675"/>
       </p:ext>
     </p:extLst>
   </p:cSld>
@@ -6671,8 +6717,8 @@
           <a:lstStyle/>
           <a:p>
             <a:r>
-              <a:rPr lang="en-AU" dirty="0" smtClean="0"/>
-              <a:t>Cert – Privacy and Settings</a:t>
+              <a:rPr lang="en-AU" dirty="0" err="1" smtClean="0"/>
+              <a:t>UnityEngine.WSA</a:t>
             </a:r>
             <a:endParaRPr lang="en-AU" dirty="0"/>
           </a:p>
@@ -6700,7 +6746,7 @@
     </p:spTree>
     <p:extLst>
       <p:ext uri="{BB962C8B-B14F-4D97-AF65-F5344CB8AC3E}">
-        <p14:creationId xmlns:p14="http://schemas.microsoft.com/office/powerpoint/2010/main" val="1562890118"/>
+        <p14:creationId xmlns:p14="http://schemas.microsoft.com/office/powerpoint/2010/main" val="357982477"/>
       </p:ext>
     </p:extLst>
   </p:cSld>
@@ -6744,6 +6790,78 @@
           <a:p>
             <a:r>
               <a:rPr lang="en-AU" dirty="0" smtClean="0"/>
+              <a:t>Cert – Privacy and Settings</a:t>
+            </a:r>
+            <a:endParaRPr lang="en-AU" dirty="0"/>
+          </a:p>
+        </p:txBody>
+      </p:sp>
+      <p:sp>
+        <p:nvSpPr>
+          <p:cNvPr id="3" name="Content Placeholder 2"/>
+          <p:cNvSpPr>
+            <a:spLocks noGrp="1"/>
+          </p:cNvSpPr>
+          <p:nvPr>
+            <p:ph idx="1"/>
+          </p:nvPr>
+        </p:nvSpPr>
+        <p:spPr/>
+        <p:txBody>
+          <a:bodyPr/>
+          <a:lstStyle/>
+          <a:p>
+            <a:endParaRPr lang="en-AU"/>
+          </a:p>
+        </p:txBody>
+      </p:sp>
+    </p:spTree>
+    <p:extLst>
+      <p:ext uri="{BB962C8B-B14F-4D97-AF65-F5344CB8AC3E}">
+        <p14:creationId xmlns:p14="http://schemas.microsoft.com/office/powerpoint/2010/main" val="1562890118"/>
+      </p:ext>
+    </p:extLst>
+  </p:cSld>
+  <p:clrMapOvr>
+    <a:masterClrMapping/>
+  </p:clrMapOvr>
+</p:sld>
+</file>
+
+<file path=ppt/slides/slide33.xml><?xml version="1.0" encoding="utf-8"?>
+<p:sld xmlns:a="http://schemas.openxmlformats.org/drawingml/2006/main" xmlns:r="http://schemas.openxmlformats.org/officeDocument/2006/relationships" xmlns:p="http://schemas.openxmlformats.org/presentationml/2006/main">
+  <p:cSld>
+    <p:spTree>
+      <p:nvGrpSpPr>
+        <p:cNvPr id="1" name=""/>
+        <p:cNvGrpSpPr/>
+        <p:nvPr/>
+      </p:nvGrpSpPr>
+      <p:grpSpPr>
+        <a:xfrm>
+          <a:off x="0" y="0"/>
+          <a:ext cx="0" cy="0"/>
+          <a:chOff x="0" y="0"/>
+          <a:chExt cx="0" cy="0"/>
+        </a:xfrm>
+      </p:grpSpPr>
+      <p:sp>
+        <p:nvSpPr>
+          <p:cNvPr id="2" name="Title 1"/>
+          <p:cNvSpPr>
+            <a:spLocks noGrp="1"/>
+          </p:cNvSpPr>
+          <p:nvPr>
+            <p:ph type="title"/>
+          </p:nvPr>
+        </p:nvSpPr>
+        <p:spPr/>
+        <p:txBody>
+          <a:bodyPr/>
+          <a:lstStyle/>
+          <a:p>
+            <a:r>
+              <a:rPr lang="en-AU" dirty="0" smtClean="0"/>
               <a:t>Cert – Required Assets</a:t>
             </a:r>
             <a:endParaRPr lang="en-AU" dirty="0"/>
@@ -6782,7 +6900,7 @@
 </p:sld>
 </file>
 
-<file path=ppt/slides/slide33.xml><?xml version="1.0" encoding="utf-8"?>
+<file path=ppt/slides/slide34.xml><?xml version="1.0" encoding="utf-8"?>
 <p:sld xmlns:a="http://schemas.openxmlformats.org/drawingml/2006/main" xmlns:r="http://schemas.openxmlformats.org/officeDocument/2006/relationships" xmlns:p="http://schemas.openxmlformats.org/presentationml/2006/main">
   <p:cSld>
     <p:spTree>

</xml_diff>

<commit_message>
Further slides on Input and Physics
</commit_message>
<xml_diff>
--- a/ST_Unity_101_Part1.pptx
+++ b/ST_Unity_101_Part1.pptx
@@ -5,7 +5,7 @@
     <p:sldMasterId id="2147483648" r:id="rId1"/>
   </p:sldMasterIdLst>
   <p:notesMasterIdLst>
-    <p:notesMasterId r:id="rId36"/>
+    <p:notesMasterId r:id="rId37"/>
   </p:notesMasterIdLst>
   <p:sldIdLst>
     <p:sldId id="256" r:id="rId2"/>
@@ -42,6 +42,7 @@
     <p:sldId id="285" r:id="rId33"/>
     <p:sldId id="286" r:id="rId34"/>
     <p:sldId id="288" r:id="rId35"/>
+    <p:sldId id="291" r:id="rId36"/>
   </p:sldIdLst>
   <p:sldSz cx="12192000" cy="6858000"/>
   <p:notesSz cx="6858000" cy="9144000"/>
@@ -209,10 +210,15 @@
             <p14:sldId id="288"/>
           </p14:sldIdLst>
         </p14:section>
+        <p14:section name="Finale" id="{C699279C-E39A-3143-B6FE-1E22FA0107B4}">
+          <p14:sldIdLst>
+            <p14:sldId id="291"/>
+          </p14:sldIdLst>
+        </p14:section>
       </p14:sectionLst>
     </p:ext>
     <p:ext uri="{EFAFB233-063F-42B5-8137-9DF3F51BA10A}">
-      <p15:sldGuideLst xmlns:p15="http://schemas.microsoft.com/office/powerpoint/2012/main"/>
+      <p15:sldGuideLst xmlns:p15="http://schemas.microsoft.com/office/powerpoint/2012/main" xmlns=""/>
     </p:ext>
   </p:extLst>
 </p:presentation>
@@ -300,7 +306,7 @@
           <a:p>
             <a:fld id="{A724FAEC-7584-44B3-B386-6ADB31723F26}" type="datetimeFigureOut">
               <a:rPr lang="en-AU" smtClean="0"/>
-              <a:t>6/05/2014</a:t>
+              <a:t>7/06/14</a:t>
             </a:fld>
             <a:endParaRPr lang="en-AU"/>
           </a:p>
@@ -710,6 +716,98 @@
 </p:notes>
 </file>
 
+<file path=ppt/notesSlides/notesSlide10.xml><?xml version="1.0" encoding="utf-8"?>
+<p:notes xmlns:a="http://schemas.openxmlformats.org/drawingml/2006/main" xmlns:r="http://schemas.openxmlformats.org/officeDocument/2006/relationships" xmlns:p="http://schemas.openxmlformats.org/presentationml/2006/main">
+  <p:cSld>
+    <p:spTree>
+      <p:nvGrpSpPr>
+        <p:cNvPr id="1" name=""/>
+        <p:cNvGrpSpPr/>
+        <p:nvPr/>
+      </p:nvGrpSpPr>
+      <p:grpSpPr>
+        <a:xfrm>
+          <a:off x="0" y="0"/>
+          <a:ext cx="0" cy="0"/>
+          <a:chOff x="0" y="0"/>
+          <a:chExt cx="0" cy="0"/>
+        </a:xfrm>
+      </p:grpSpPr>
+      <p:sp>
+        <p:nvSpPr>
+          <p:cNvPr id="2" name="Slide Image Placeholder 1"/>
+          <p:cNvSpPr>
+            <a:spLocks noGrp="1" noRot="1" noChangeAspect="1"/>
+          </p:cNvSpPr>
+          <p:nvPr>
+            <p:ph type="sldImg"/>
+          </p:nvPr>
+        </p:nvSpPr>
+        <p:spPr/>
+      </p:sp>
+      <p:sp>
+        <p:nvSpPr>
+          <p:cNvPr id="3" name="Notes Placeholder 2"/>
+          <p:cNvSpPr>
+            <a:spLocks noGrp="1"/>
+          </p:cNvSpPr>
+          <p:nvPr>
+            <p:ph type="body" idx="1"/>
+          </p:nvPr>
+        </p:nvSpPr>
+        <p:spPr/>
+        <p:txBody>
+          <a:bodyPr/>
+          <a:lstStyle/>
+          <a:p>
+            <a:r>
+              <a:rPr lang="en-AU" dirty="0" smtClean="0"/>
+              <a:t>Look</a:t>
+            </a:r>
+            <a:r>
+              <a:rPr lang="en-AU" baseline="0" dirty="0" smtClean="0"/>
+              <a:t> into things like resizing and other hooks that can be used, hint at things for sharing and other APIs that won’t be covered in detail</a:t>
+            </a:r>
+            <a:endParaRPr lang="en-AU" dirty="0"/>
+          </a:p>
+        </p:txBody>
+      </p:sp>
+      <p:sp>
+        <p:nvSpPr>
+          <p:cNvPr id="4" name="Slide Number Placeholder 3"/>
+          <p:cNvSpPr>
+            <a:spLocks noGrp="1"/>
+          </p:cNvSpPr>
+          <p:nvPr>
+            <p:ph type="sldNum" sz="quarter" idx="10"/>
+          </p:nvPr>
+        </p:nvSpPr>
+        <p:spPr/>
+        <p:txBody>
+          <a:bodyPr/>
+          <a:lstStyle/>
+          <a:p>
+            <a:fld id="{814B4410-C701-44AF-9574-9C423ED2E94B}" type="slidenum">
+              <a:rPr lang="en-AU" smtClean="0"/>
+              <a:t>31</a:t>
+            </a:fld>
+            <a:endParaRPr lang="en-AU"/>
+          </a:p>
+        </p:txBody>
+      </p:sp>
+    </p:spTree>
+    <p:extLst>
+      <p:ext uri="{BB962C8B-B14F-4D97-AF65-F5344CB8AC3E}">
+        <p14:creationId xmlns:p14="http://schemas.microsoft.com/office/powerpoint/2010/main" val="346376531"/>
+      </p:ext>
+    </p:extLst>
+  </p:cSld>
+  <p:clrMapOvr>
+    <a:masterClrMapping/>
+  </p:clrMapOvr>
+</p:notes>
+</file>
+
 <file path=ppt/notesSlides/notesSlide2.xml><?xml version="1.0" encoding="utf-8"?>
 <p:notes xmlns:a="http://schemas.openxmlformats.org/drawingml/2006/main" xmlns:r="http://schemas.openxmlformats.org/officeDocument/2006/relationships" xmlns:p="http://schemas.openxmlformats.org/presentationml/2006/main">
   <p:cSld>
@@ -1071,29 +1169,28 @@
           <a:lstStyle/>
           <a:p>
             <a:r>
-              <a:rPr lang="en-AU" dirty="0" smtClean="0"/>
-              <a:t>The transform</a:t>
-            </a:r>
-            <a:r>
-              <a:rPr lang="en-AU" baseline="0" dirty="0" smtClean="0"/>
-              <a:t> is the way Unity describes the object’s position, rotation and scale (size) in the game world. There are two variants of each of these, the global position, rotation and scale, and the local position, rotation and scale.</a:t>
-            </a:r>
-          </a:p>
-          <a:p>
-            <a:r>
-              <a:rPr lang="en-AU" baseline="0" dirty="0" smtClean="0"/>
-              <a:t>The local is usually equal to the global unless the object has a parent Transform. When the object has a parent, the Local variants are relative to the parent transform, and accessing/editing the global variants will operate relative to the world rather than the parent. &lt;give or show examples in editor&gt;</a:t>
-            </a:r>
-          </a:p>
-          <a:p>
-            <a:endParaRPr lang="en-AU" baseline="0" dirty="0" smtClean="0"/>
-          </a:p>
-          <a:p>
-            <a:r>
-              <a:rPr lang="en-AU" baseline="0" smtClean="0"/>
-              <a:t>ADD A DIAGRAM TO THIS SLIDE</a:t>
-            </a:r>
-            <a:endParaRPr lang="en-AU" dirty="0"/>
+              <a:rPr lang="en-US" dirty="0" smtClean="0"/>
+              <a:t>The project view</a:t>
+            </a:r>
+            <a:r>
+              <a:rPr lang="en-US" baseline="0" dirty="0" smtClean="0"/>
+              <a:t> is your standard file explorer for the solution. It contains a structured view of all of the files that Unity has imported and knows about within your Assets folder. Within this view you can create new assets, search, tag, rename, open or delete.</a:t>
+            </a:r>
+          </a:p>
+          <a:p>
+            <a:endParaRPr lang="en-US" baseline="0" dirty="0" smtClean="0"/>
+          </a:p>
+          <a:p>
+            <a:r>
+              <a:rPr lang="en-US" baseline="0" dirty="0" smtClean="0"/>
+              <a:t>One important note is that you should use this view to delete folders rather than your normal file manager. The reason for this is because Unity assigns metadata to each file through an associated file called a meta file. These files live in the same directory as their associated file and are hidden or visible depending on your editor preferences.</a:t>
+            </a:r>
+          </a:p>
+          <a:p>
+            <a:r>
+              <a:rPr lang="en-US" baseline="0" dirty="0" smtClean="0"/>
+              <a:t>If you delete a file from here, Unity will delete the meta file. If you do not, then in the case of folders, Unity will re-create the folder until you delete the meta file.</a:t>
+            </a:r>
           </a:p>
         </p:txBody>
       </p:sp>
@@ -1114,7 +1211,7 @@
           <a:p>
             <a:fld id="{814B4410-C701-44AF-9574-9C423ED2E94B}" type="slidenum">
               <a:rPr lang="en-AU" smtClean="0"/>
-              <a:t>14</a:t>
+              <a:t>8</a:t>
             </a:fld>
             <a:endParaRPr lang="en-AU"/>
           </a:p>
@@ -1123,7 +1220,7 @@
     </p:spTree>
     <p:extLst>
       <p:ext uri="{BB962C8B-B14F-4D97-AF65-F5344CB8AC3E}">
-        <p14:creationId xmlns:p14="http://schemas.microsoft.com/office/powerpoint/2010/main" val="3153185476"/>
+        <p14:creationId xmlns:p14="http://schemas.microsoft.com/office/powerpoint/2010/main" val="531124234"/>
       </p:ext>
     </p:extLst>
   </p:cSld>
@@ -1178,10 +1275,31 @@
           <a:lstStyle/>
           <a:p>
             <a:r>
-              <a:rPr lang="en-AU" dirty="0" smtClean="0"/>
-              <a:t>Change this to a diagram and split into multiple slides</a:t>
-            </a:r>
-            <a:endParaRPr lang="en-AU" dirty="0"/>
+              <a:rPr lang="en-US" dirty="0" smtClean="0"/>
+              <a:t>The inspector is the most powerful tool Unity</a:t>
+            </a:r>
+            <a:r>
+              <a:rPr lang="en-US" baseline="0" dirty="0" smtClean="0"/>
+              <a:t> offers within the editor. The Inspector is a dynamically generated property sheet for any selected object and its components. You can use the editor to tweak values, and in the case of scripts, any public fields that the script may have (assuming it has an editor). This allows you to create scripts and then edit per-instance data for the script once it is assigned to a </a:t>
+            </a:r>
+            <a:r>
+              <a:rPr lang="en-US" baseline="0" dirty="0" err="1" smtClean="0"/>
+              <a:t>GameObject</a:t>
+            </a:r>
+            <a:r>
+              <a:rPr lang="en-US" baseline="0" dirty="0" smtClean="0"/>
+              <a:t>.</a:t>
+            </a:r>
+          </a:p>
+          <a:p>
+            <a:endParaRPr lang="en-US" baseline="0" dirty="0" smtClean="0"/>
+          </a:p>
+          <a:p>
+            <a:r>
+              <a:rPr lang="en-US" baseline="0" dirty="0" smtClean="0"/>
+              <a:t>Advanced users can extend the editor for custom or pre-defined types to allow for some powerful editor scripting and functionality. For more information on this, take a look at the Unity documentation.</a:t>
+            </a:r>
+            <a:endParaRPr lang="en-US" dirty="0"/>
           </a:p>
         </p:txBody>
       </p:sp>
@@ -1202,7 +1320,7 @@
           <a:p>
             <a:fld id="{814B4410-C701-44AF-9574-9C423ED2E94B}" type="slidenum">
               <a:rPr lang="en-AU" smtClean="0"/>
-              <a:t>20</a:t>
+              <a:t>9</a:t>
             </a:fld>
             <a:endParaRPr lang="en-AU"/>
           </a:p>
@@ -1211,7 +1329,7 @@
     </p:spTree>
     <p:extLst>
       <p:ext uri="{BB962C8B-B14F-4D97-AF65-F5344CB8AC3E}">
-        <p14:creationId xmlns:p14="http://schemas.microsoft.com/office/powerpoint/2010/main" val="1783817807"/>
+        <p14:creationId xmlns:p14="http://schemas.microsoft.com/office/powerpoint/2010/main" val="2221678994"/>
       </p:ext>
     </p:extLst>
   </p:cSld>
@@ -1267,11 +1385,26 @@
           <a:p>
             <a:r>
               <a:rPr lang="en-AU" dirty="0" smtClean="0"/>
-              <a:t>Details</a:t>
+              <a:t>The transform</a:t>
             </a:r>
             <a:r>
               <a:rPr lang="en-AU" baseline="0" dirty="0" smtClean="0"/>
-              <a:t> about accessing input axis from code</a:t>
+              <a:t> is the way Unity describes the object’s position, rotation and scale (size) in the game world. There are two variants of each of these, the global position, rotation and scale, and the local position, rotation and scale.</a:t>
+            </a:r>
+          </a:p>
+          <a:p>
+            <a:r>
+              <a:rPr lang="en-AU" baseline="0" dirty="0" smtClean="0"/>
+              <a:t>The local is usually equal to the global unless the object has a parent Transform. When the object has a parent, the Local variants are relative to the parent transform, and accessing/editing the global variants will operate relative to the world rather than the parent. &lt;give or show examples in editor&gt;</a:t>
+            </a:r>
+          </a:p>
+          <a:p>
+            <a:endParaRPr lang="en-AU" baseline="0" dirty="0" smtClean="0"/>
+          </a:p>
+          <a:p>
+            <a:r>
+              <a:rPr lang="en-AU" baseline="0" smtClean="0"/>
+              <a:t>ADD A DIAGRAM TO THIS SLIDE</a:t>
             </a:r>
             <a:endParaRPr lang="en-AU" dirty="0"/>
           </a:p>
@@ -1294,7 +1427,7 @@
           <a:p>
             <a:fld id="{814B4410-C701-44AF-9574-9C423ED2E94B}" type="slidenum">
               <a:rPr lang="en-AU" smtClean="0"/>
-              <a:t>24</a:t>
+              <a:t>14</a:t>
             </a:fld>
             <a:endParaRPr lang="en-AU"/>
           </a:p>
@@ -1303,7 +1436,7 @@
     </p:spTree>
     <p:extLst>
       <p:ext uri="{BB962C8B-B14F-4D97-AF65-F5344CB8AC3E}">
-        <p14:creationId xmlns:p14="http://schemas.microsoft.com/office/powerpoint/2010/main" val="1849324634"/>
+        <p14:creationId xmlns:p14="http://schemas.microsoft.com/office/powerpoint/2010/main" val="3153185476"/>
       </p:ext>
     </p:extLst>
   </p:cSld>
@@ -1359,11 +1492,7 @@
           <a:p>
             <a:r>
               <a:rPr lang="en-AU" dirty="0" smtClean="0"/>
-              <a:t>Look</a:t>
-            </a:r>
-            <a:r>
-              <a:rPr lang="en-AU" baseline="0" dirty="0" smtClean="0"/>
-              <a:t> into things like resizing and other hooks that can be used, hint at things for sharing and other APIs that won’t be covered in detail</a:t>
+              <a:t>Change this to a diagram and split into multiple slides</a:t>
             </a:r>
             <a:endParaRPr lang="en-AU" dirty="0"/>
           </a:p>
@@ -1386,7 +1515,7 @@
           <a:p>
             <a:fld id="{814B4410-C701-44AF-9574-9C423ED2E94B}" type="slidenum">
               <a:rPr lang="en-AU" smtClean="0"/>
-              <a:t>31</a:t>
+              <a:t>20</a:t>
             </a:fld>
             <a:endParaRPr lang="en-AU"/>
           </a:p>
@@ -1395,7 +1524,99 @@
     </p:spTree>
     <p:extLst>
       <p:ext uri="{BB962C8B-B14F-4D97-AF65-F5344CB8AC3E}">
-        <p14:creationId xmlns:p14="http://schemas.microsoft.com/office/powerpoint/2010/main" val="346376531"/>
+        <p14:creationId xmlns:p14="http://schemas.microsoft.com/office/powerpoint/2010/main" val="1783817807"/>
+      </p:ext>
+    </p:extLst>
+  </p:cSld>
+  <p:clrMapOvr>
+    <a:masterClrMapping/>
+  </p:clrMapOvr>
+</p:notes>
+</file>
+
+<file path=ppt/notesSlides/notesSlide9.xml><?xml version="1.0" encoding="utf-8"?>
+<p:notes xmlns:a="http://schemas.openxmlformats.org/drawingml/2006/main" xmlns:r="http://schemas.openxmlformats.org/officeDocument/2006/relationships" xmlns:p="http://schemas.openxmlformats.org/presentationml/2006/main">
+  <p:cSld>
+    <p:spTree>
+      <p:nvGrpSpPr>
+        <p:cNvPr id="1" name=""/>
+        <p:cNvGrpSpPr/>
+        <p:nvPr/>
+      </p:nvGrpSpPr>
+      <p:grpSpPr>
+        <a:xfrm>
+          <a:off x="0" y="0"/>
+          <a:ext cx="0" cy="0"/>
+          <a:chOff x="0" y="0"/>
+          <a:chExt cx="0" cy="0"/>
+        </a:xfrm>
+      </p:grpSpPr>
+      <p:sp>
+        <p:nvSpPr>
+          <p:cNvPr id="2" name="Slide Image Placeholder 1"/>
+          <p:cNvSpPr>
+            <a:spLocks noGrp="1" noRot="1" noChangeAspect="1"/>
+          </p:cNvSpPr>
+          <p:nvPr>
+            <p:ph type="sldImg"/>
+          </p:nvPr>
+        </p:nvSpPr>
+        <p:spPr/>
+      </p:sp>
+      <p:sp>
+        <p:nvSpPr>
+          <p:cNvPr id="3" name="Notes Placeholder 2"/>
+          <p:cNvSpPr>
+            <a:spLocks noGrp="1"/>
+          </p:cNvSpPr>
+          <p:nvPr>
+            <p:ph type="body" idx="1"/>
+          </p:nvPr>
+        </p:nvSpPr>
+        <p:spPr/>
+        <p:txBody>
+          <a:bodyPr/>
+          <a:lstStyle/>
+          <a:p>
+            <a:r>
+              <a:rPr lang="en-AU" dirty="0" smtClean="0"/>
+              <a:t>Details</a:t>
+            </a:r>
+            <a:r>
+              <a:rPr lang="en-AU" baseline="0" dirty="0" smtClean="0"/>
+              <a:t> about accessing input axis from code</a:t>
+            </a:r>
+            <a:endParaRPr lang="en-AU" dirty="0"/>
+          </a:p>
+        </p:txBody>
+      </p:sp>
+      <p:sp>
+        <p:nvSpPr>
+          <p:cNvPr id="4" name="Slide Number Placeholder 3"/>
+          <p:cNvSpPr>
+            <a:spLocks noGrp="1"/>
+          </p:cNvSpPr>
+          <p:nvPr>
+            <p:ph type="sldNum" sz="quarter" idx="10"/>
+          </p:nvPr>
+        </p:nvSpPr>
+        <p:spPr/>
+        <p:txBody>
+          <a:bodyPr/>
+          <a:lstStyle/>
+          <a:p>
+            <a:fld id="{814B4410-C701-44AF-9574-9C423ED2E94B}" type="slidenum">
+              <a:rPr lang="en-AU" smtClean="0"/>
+              <a:t>24</a:t>
+            </a:fld>
+            <a:endParaRPr lang="en-AU"/>
+          </a:p>
+        </p:txBody>
+      </p:sp>
+    </p:spTree>
+    <p:extLst>
+      <p:ext uri="{BB962C8B-B14F-4D97-AF65-F5344CB8AC3E}">
+        <p14:creationId xmlns:p14="http://schemas.microsoft.com/office/powerpoint/2010/main" val="1849324634"/>
       </p:ext>
     </p:extLst>
   </p:cSld>
@@ -1536,7 +1757,7 @@
           <a:p>
             <a:fld id="{C33626A4-D0D9-4927-8F98-739B1D29D8AB}" type="datetimeFigureOut">
               <a:rPr lang="en-AU" smtClean="0"/>
-              <a:t>6/05/2014</a:t>
+              <a:t>7/06/14</a:t>
             </a:fld>
             <a:endParaRPr lang="en-AU"/>
           </a:p>
@@ -1706,7 +1927,7 @@
           <a:p>
             <a:fld id="{C33626A4-D0D9-4927-8F98-739B1D29D8AB}" type="datetimeFigureOut">
               <a:rPr lang="en-AU" smtClean="0"/>
-              <a:t>6/05/2014</a:t>
+              <a:t>7/06/14</a:t>
             </a:fld>
             <a:endParaRPr lang="en-AU"/>
           </a:p>
@@ -1886,7 +2107,7 @@
           <a:p>
             <a:fld id="{C33626A4-D0D9-4927-8F98-739B1D29D8AB}" type="datetimeFigureOut">
               <a:rPr lang="en-AU" smtClean="0"/>
-              <a:t>6/05/2014</a:t>
+              <a:t>7/06/14</a:t>
             </a:fld>
             <a:endParaRPr lang="en-AU"/>
           </a:p>
@@ -2056,7 +2277,7 @@
           <a:p>
             <a:fld id="{C33626A4-D0D9-4927-8F98-739B1D29D8AB}" type="datetimeFigureOut">
               <a:rPr lang="en-AU" smtClean="0"/>
-              <a:t>6/05/2014</a:t>
+              <a:t>7/06/14</a:t>
             </a:fld>
             <a:endParaRPr lang="en-AU"/>
           </a:p>
@@ -2302,7 +2523,7 @@
           <a:p>
             <a:fld id="{C33626A4-D0D9-4927-8F98-739B1D29D8AB}" type="datetimeFigureOut">
               <a:rPr lang="en-AU" smtClean="0"/>
-              <a:t>6/05/2014</a:t>
+              <a:t>7/06/14</a:t>
             </a:fld>
             <a:endParaRPr lang="en-AU"/>
           </a:p>
@@ -2534,7 +2755,7 @@
           <a:p>
             <a:fld id="{C33626A4-D0D9-4927-8F98-739B1D29D8AB}" type="datetimeFigureOut">
               <a:rPr lang="en-AU" smtClean="0"/>
-              <a:t>6/05/2014</a:t>
+              <a:t>7/06/14</a:t>
             </a:fld>
             <a:endParaRPr lang="en-AU"/>
           </a:p>
@@ -2901,7 +3122,7 @@
           <a:p>
             <a:fld id="{C33626A4-D0D9-4927-8F98-739B1D29D8AB}" type="datetimeFigureOut">
               <a:rPr lang="en-AU" smtClean="0"/>
-              <a:t>6/05/2014</a:t>
+              <a:t>7/06/14</a:t>
             </a:fld>
             <a:endParaRPr lang="en-AU"/>
           </a:p>
@@ -3019,7 +3240,7 @@
           <a:p>
             <a:fld id="{C33626A4-D0D9-4927-8F98-739B1D29D8AB}" type="datetimeFigureOut">
               <a:rPr lang="en-AU" smtClean="0"/>
-              <a:t>6/05/2014</a:t>
+              <a:t>7/06/14</a:t>
             </a:fld>
             <a:endParaRPr lang="en-AU"/>
           </a:p>
@@ -3114,7 +3335,7 @@
           <a:p>
             <a:fld id="{C33626A4-D0D9-4927-8F98-739B1D29D8AB}" type="datetimeFigureOut">
               <a:rPr lang="en-AU" smtClean="0"/>
-              <a:t>6/05/2014</a:t>
+              <a:t>7/06/14</a:t>
             </a:fld>
             <a:endParaRPr lang="en-AU"/>
           </a:p>
@@ -3391,7 +3612,7 @@
           <a:p>
             <a:fld id="{C33626A4-D0D9-4927-8F98-739B1D29D8AB}" type="datetimeFigureOut">
               <a:rPr lang="en-AU" smtClean="0"/>
-              <a:t>6/05/2014</a:t>
+              <a:t>7/06/14</a:t>
             </a:fld>
             <a:endParaRPr lang="en-AU"/>
           </a:p>
@@ -3644,7 +3865,7 @@
           <a:p>
             <a:fld id="{C33626A4-D0D9-4927-8F98-739B1D29D8AB}" type="datetimeFigureOut">
               <a:rPr lang="en-AU" smtClean="0"/>
-              <a:t>6/05/2014</a:t>
+              <a:t>7/06/14</a:t>
             </a:fld>
             <a:endParaRPr lang="en-AU"/>
           </a:p>
@@ -3709,9 +3930,12 @@
 <p:sldMaster xmlns:a="http://schemas.openxmlformats.org/drawingml/2006/main" xmlns:r="http://schemas.openxmlformats.org/officeDocument/2006/relationships" xmlns:p="http://schemas.openxmlformats.org/presentationml/2006/main">
   <p:cSld>
     <p:bg>
-      <p:bgRef idx="1001">
-        <a:schemeClr val="bg1"/>
-      </p:bgRef>
+      <p:bgPr>
+        <a:solidFill>
+          <a:srgbClr val="131313"/>
+        </a:solidFill>
+        <a:effectLst/>
+      </p:bgPr>
     </p:bg>
     <p:spTree>
       <p:nvGrpSpPr>
@@ -3857,7 +4081,7 @@
           <a:p>
             <a:fld id="{C33626A4-D0D9-4927-8F98-739B1D29D8AB}" type="datetimeFigureOut">
               <a:rPr lang="en-AU" smtClean="0"/>
-              <a:t>6/05/2014</a:t>
+              <a:t>7/06/14</a:t>
             </a:fld>
             <a:endParaRPr lang="en-AU"/>
           </a:p>
@@ -3948,7 +4172,7 @@
       </p:ext>
     </p:extLst>
   </p:cSld>
-  <p:clrMap bg1="lt1" tx1="dk1" bg2="lt2" tx2="dk2" accent1="accent1" accent2="accent2" accent3="accent3" accent4="accent4" accent5="accent5" accent6="accent6" hlink="hlink" folHlink="folHlink"/>
+  <p:clrMap bg1="dk1" tx1="lt1" bg2="dk2" tx2="lt2" accent1="accent1" accent2="accent2" accent3="accent3" accent4="accent4" accent5="accent5" accent6="accent6" hlink="hlink" folHlink="folHlink"/>
   <p:sldLayoutIdLst>
     <p:sldLayoutId id="2147483649" r:id="rId1"/>
     <p:sldLayoutId id="2147483650" r:id="rId2"/>
@@ -5611,8 +5835,17 @@
             <a:pPr lvl="1"/>
             <a:r>
               <a:rPr lang="en-AU" dirty="0" smtClean="0"/>
-              <a:t>More on this in Part 2</a:t>
-            </a:r>
+              <a:t>What the mesh looks like (</a:t>
+            </a:r>
+            <a:r>
+              <a:rPr lang="en-AU" dirty="0" err="1" smtClean="0"/>
+              <a:t>Shader</a:t>
+            </a:r>
+            <a:r>
+              <a:rPr lang="en-AU" dirty="0" smtClean="0"/>
+              <a:t> + Texture(s))</a:t>
+            </a:r>
+            <a:endParaRPr lang="en-AU" dirty="0" smtClean="0"/>
           </a:p>
           <a:p>
             <a:r>
@@ -5927,7 +6160,16 @@
               <a:rPr lang="en-AU" sz="1800" dirty="0" smtClean="0">
                 <a:hlinkClick r:id="rId2"/>
               </a:rPr>
-              <a:t>docs.unity3d.com/Documentation/ScriptReference/Input.html</a:t>
+              <a:t>docs.unity3d.com/Documentation/ScriptReference/</a:t>
+            </a:r>
+            <a:r>
+              <a:rPr lang="en-AU" sz="1800" dirty="0" smtClean="0">
+                <a:solidFill>
+                  <a:srgbClr val="FFFFFF"/>
+                </a:solidFill>
+                <a:hlinkClick r:id="rId2"/>
+              </a:rPr>
+              <a:t>Input.html</a:t>
             </a:r>
             <a:r>
               <a:rPr lang="en-AU" sz="1800" dirty="0" smtClean="0"/>
@@ -6004,7 +6246,33 @@
           <a:bodyPr/>
           <a:lstStyle/>
           <a:p>
-            <a:endParaRPr lang="en-AU"/>
+            <a:r>
+              <a:rPr lang="en-AU" dirty="0" smtClean="0"/>
+              <a:t>“Joystick” Axis or Button</a:t>
+            </a:r>
+          </a:p>
+          <a:p>
+            <a:r>
+              <a:rPr lang="en-AU" dirty="0" smtClean="0"/>
+              <a:t>Cleaner Code</a:t>
+            </a:r>
+          </a:p>
+          <a:p>
+            <a:r>
+              <a:rPr lang="en-AU" dirty="0" smtClean="0"/>
+              <a:t>Positive/Negative “Directions”</a:t>
+            </a:r>
+          </a:p>
+          <a:p>
+            <a:r>
+              <a:rPr lang="en-AU" dirty="0" smtClean="0"/>
+              <a:t>Primary/Secondar</a:t>
+            </a:r>
+            <a:r>
+              <a:rPr lang="en-AU" dirty="0" smtClean="0"/>
+              <a:t>y Options</a:t>
+            </a:r>
+            <a:endParaRPr lang="en-AU" dirty="0"/>
           </a:p>
         </p:txBody>
       </p:sp>
@@ -6025,7 +6293,7 @@
           <a:p>
             <a:r>
               <a:rPr lang="en-AU" dirty="0" smtClean="0"/>
-              <a:t>Image of Unity input editor goes here</a:t>
+              <a:t>IMAGE OF INPUT EDITOR IN UNITY GOES HERE</a:t>
             </a:r>
             <a:endParaRPr lang="en-AU" dirty="0"/>
           </a:p>
@@ -6099,7 +6367,36 @@
           <a:bodyPr/>
           <a:lstStyle/>
           <a:p>
-            <a:endParaRPr lang="en-AU"/>
+            <a:r>
+              <a:rPr lang="en-AU" dirty="0" err="1" smtClean="0"/>
+              <a:t>Input.GetAxis</a:t>
+            </a:r>
+            <a:r>
+              <a:rPr lang="en-AU" dirty="0" smtClean="0"/>
+              <a:t>(string name)</a:t>
+            </a:r>
+          </a:p>
+          <a:p>
+            <a:r>
+              <a:rPr lang="en-AU" dirty="0" err="1" smtClean="0"/>
+              <a:t>Input.GetButton</a:t>
+            </a:r>
+            <a:r>
+              <a:rPr lang="en-AU" dirty="0" smtClean="0"/>
+              <a:t>(string name)</a:t>
+            </a:r>
+          </a:p>
+          <a:p>
+            <a:endParaRPr lang="en-AU" dirty="0"/>
+          </a:p>
+          <a:p>
+            <a:r>
+              <a:rPr lang="en-AU" dirty="0" smtClean="0"/>
+              <a:t>FULL CODE SAMPLE HERE</a:t>
+            </a:r>
+          </a:p>
+          <a:p>
+            <a:endParaRPr lang="en-AU" dirty="0"/>
           </a:p>
         </p:txBody>
       </p:sp>
@@ -6171,7 +6468,60 @@
           <a:bodyPr/>
           <a:lstStyle/>
           <a:p>
-            <a:endParaRPr lang="en-AU"/>
+            <a:r>
+              <a:rPr lang="en-AU" dirty="0" smtClean="0"/>
+              <a:t>3D &amp; 2D </a:t>
+            </a:r>
+            <a:endParaRPr lang="en-AU" dirty="0"/>
+          </a:p>
+          <a:p>
+            <a:r>
+              <a:rPr lang="en-AU" dirty="0" smtClean="0"/>
+              <a:t>Rigid Body + Colliders</a:t>
+            </a:r>
+          </a:p>
+          <a:p>
+            <a:r>
+              <a:rPr lang="en-AU" dirty="0" smtClean="0"/>
+              <a:t>Many different collider shapes</a:t>
+            </a:r>
+            <a:endParaRPr lang="en-AU" dirty="0" smtClean="0"/>
+          </a:p>
+          <a:p>
+            <a:endParaRPr lang="en-AU" dirty="0"/>
+          </a:p>
+          <a:p>
+            <a:r>
+              <a:rPr lang="en-AU" dirty="0" smtClean="0"/>
+              <a:t>Add Rigid Body &amp; Collider to </a:t>
+            </a:r>
+            <a:r>
+              <a:rPr lang="en-AU" dirty="0" err="1" smtClean="0"/>
+              <a:t>GameObject</a:t>
+            </a:r>
+            <a:r>
+              <a:rPr lang="en-AU" dirty="0" smtClean="0"/>
+              <a:t>, set parameters</a:t>
+            </a:r>
+          </a:p>
+          <a:p>
+            <a:r>
+              <a:rPr lang="en-AU" dirty="0" smtClean="0"/>
+              <a:t>Gravity Setting in Player Physics Settings</a:t>
+            </a:r>
+          </a:p>
+          <a:p>
+            <a:r>
+              <a:rPr lang="en-AU" dirty="0" smtClean="0"/>
+              <a:t>Everything “works”</a:t>
+            </a:r>
+          </a:p>
+          <a:p>
+            <a:r>
+              <a:rPr lang="en-AU" dirty="0" smtClean="0"/>
+              <a:t>Can provide custom collision handling</a:t>
+            </a:r>
+            <a:endParaRPr lang="en-AU" dirty="0" smtClean="0"/>
           </a:p>
         </p:txBody>
       </p:sp>
@@ -6967,6 +7317,78 @@
     <p:extLst>
       <p:ext uri="{BB962C8B-B14F-4D97-AF65-F5344CB8AC3E}">
         <p14:creationId xmlns:p14="http://schemas.microsoft.com/office/powerpoint/2010/main" val="1641751476"/>
+      </p:ext>
+    </p:extLst>
+  </p:cSld>
+  <p:clrMapOvr>
+    <a:masterClrMapping/>
+  </p:clrMapOvr>
+</p:sld>
+</file>
+
+<file path=ppt/slides/slide35.xml><?xml version="1.0" encoding="utf-8"?>
+<p:sld xmlns:a="http://schemas.openxmlformats.org/drawingml/2006/main" xmlns:r="http://schemas.openxmlformats.org/officeDocument/2006/relationships" xmlns:p="http://schemas.openxmlformats.org/presentationml/2006/main">
+  <p:cSld>
+    <p:spTree>
+      <p:nvGrpSpPr>
+        <p:cNvPr id="1" name=""/>
+        <p:cNvGrpSpPr/>
+        <p:nvPr/>
+      </p:nvGrpSpPr>
+      <p:grpSpPr>
+        <a:xfrm>
+          <a:off x="0" y="0"/>
+          <a:ext cx="0" cy="0"/>
+          <a:chOff x="0" y="0"/>
+          <a:chExt cx="0" cy="0"/>
+        </a:xfrm>
+      </p:grpSpPr>
+      <p:sp>
+        <p:nvSpPr>
+          <p:cNvPr id="4" name="Title 3"/>
+          <p:cNvSpPr>
+            <a:spLocks noGrp="1"/>
+          </p:cNvSpPr>
+          <p:nvPr>
+            <p:ph type="title"/>
+          </p:nvPr>
+        </p:nvSpPr>
+        <p:spPr/>
+        <p:txBody>
+          <a:bodyPr/>
+          <a:lstStyle/>
+          <a:p>
+            <a:r>
+              <a:rPr lang="en-US" dirty="0" smtClean="0"/>
+              <a:t>Further Reading</a:t>
+            </a:r>
+            <a:endParaRPr lang="en-US" dirty="0"/>
+          </a:p>
+        </p:txBody>
+      </p:sp>
+      <p:sp>
+        <p:nvSpPr>
+          <p:cNvPr id="5" name="Content Placeholder 4"/>
+          <p:cNvSpPr>
+            <a:spLocks noGrp="1"/>
+          </p:cNvSpPr>
+          <p:nvPr>
+            <p:ph idx="1"/>
+          </p:nvPr>
+        </p:nvSpPr>
+        <p:spPr/>
+        <p:txBody>
+          <a:bodyPr/>
+          <a:lstStyle/>
+          <a:p>
+            <a:endParaRPr lang="en-US"/>
+          </a:p>
+        </p:txBody>
+      </p:sp>
+    </p:spTree>
+    <p:extLst>
+      <p:ext uri="{BB962C8B-B14F-4D97-AF65-F5344CB8AC3E}">
+        <p14:creationId xmlns:p14="http://schemas.microsoft.com/office/powerpoint/2010/main" val="3633209509"/>
       </p:ext>
     </p:extLst>
   </p:cSld>
@@ -7485,7 +7907,29 @@
           <a:bodyPr/>
           <a:lstStyle/>
           <a:p>
-            <a:endParaRPr lang="en-AU"/>
+            <a:r>
+              <a:rPr lang="en-AU" dirty="0" smtClean="0"/>
+              <a:t>Files in the Project</a:t>
+            </a:r>
+          </a:p>
+          <a:p>
+            <a:r>
+              <a:rPr lang="en-AU" dirty="0" smtClean="0"/>
+              <a:t>Create/Rename/Delete</a:t>
+            </a:r>
+          </a:p>
+          <a:p>
+            <a:r>
+              <a:rPr lang="en-AU" dirty="0" smtClean="0"/>
+              <a:t>Use this view to delete</a:t>
+            </a:r>
+          </a:p>
+          <a:p>
+            <a:r>
+              <a:rPr lang="en-AU" dirty="0" smtClean="0"/>
+              <a:t>Search at top</a:t>
+            </a:r>
+            <a:endParaRPr lang="en-AU" dirty="0"/>
           </a:p>
         </p:txBody>
       </p:sp>
@@ -7500,7 +7944,7 @@
           </p:nvPr>
         </p:nvPicPr>
         <p:blipFill rotWithShape="1">
-          <a:blip r:embed="rId2" cstate="print">
+          <a:blip r:embed="rId3" cstate="print">
             <a:extLst>
               <a:ext uri="{28A0092B-C50C-407E-A947-70E740481C1C}">
                 <a14:useLocalDpi xmlns:a14="http://schemas.microsoft.com/office/drawing/2010/main" val="0"/>
@@ -7585,7 +8029,29 @@
           <a:bodyPr/>
           <a:lstStyle/>
           <a:p>
-            <a:endParaRPr lang="en-AU"/>
+            <a:r>
+              <a:rPr lang="en-AU" dirty="0" smtClean="0"/>
+              <a:t>Edit object parameters</a:t>
+            </a:r>
+          </a:p>
+          <a:p>
+            <a:r>
+              <a:rPr lang="en-AU" dirty="0" smtClean="0"/>
+              <a:t>Inspect and edit while playing</a:t>
+            </a:r>
+          </a:p>
+          <a:p>
+            <a:r>
+              <a:rPr lang="en-AU" dirty="0" smtClean="0"/>
+              <a:t>Dynamically generated</a:t>
+            </a:r>
+          </a:p>
+          <a:p>
+            <a:r>
+              <a:rPr lang="en-AU" dirty="0" smtClean="0"/>
+              <a:t>Can use custom editors</a:t>
+            </a:r>
+            <a:endParaRPr lang="en-AU" dirty="0"/>
           </a:p>
         </p:txBody>
       </p:sp>
@@ -7600,7 +8066,7 @@
           </p:nvPr>
         </p:nvPicPr>
         <p:blipFill>
-          <a:blip r:embed="rId2">
+          <a:blip r:embed="rId3">
             <a:extLst>
               <a:ext uri="{28A0092B-C50C-407E-A947-70E740481C1C}">
                 <a14:useLocalDpi xmlns:a14="http://schemas.microsoft.com/office/drawing/2010/main" val="0"/>
@@ -7674,7 +8140,7 @@
     </a:clrScheme>
     <a:fontScheme name="Office">
       <a:majorFont>
-        <a:latin typeface="Calibri Light" panose="020F0302020204030204"/>
+        <a:latin typeface="Calibri Light"/>
         <a:ea typeface=""/>
         <a:cs typeface=""/>
         <a:font script="Jpan" typeface="ＭＳ Ｐゴシック"/>
@@ -7709,7 +8175,7 @@
         <a:font script="Geor" typeface="Sylfaen"/>
       </a:majorFont>
       <a:minorFont>
-        <a:latin typeface="Calibri" panose="020F0502020204030204"/>
+        <a:latin typeface="Calibri"/>
         <a:ea typeface=""/>
         <a:cs typeface=""/>
         <a:font script="Jpan" typeface="ＭＳ Ｐゴシック"/>
@@ -7886,7 +8352,7 @@
   <a:extraClrSchemeLst/>
   <a:extLst>
     <a:ext uri="{05A4C25C-085E-4340-85A3-A5531E510DB2}">
-      <thm15:themeFamily xmlns:thm15="http://schemas.microsoft.com/office/thememl/2012/main" name="Office Theme" id="{62F939B6-93AF-4DB8-9C6B-D6C7DFDC589F}" vid="{4A3C46E8-61CC-4603-A589-7422A47A8E4A}"/>
+      <thm15:themeFamily xmlns:thm15="http://schemas.microsoft.com/office/thememl/2012/main" xmlns="" name="Office Theme" id="{62F939B6-93AF-4DB8-9C6B-D6C7DFDC589F}" vid="{4A3C46E8-61CC-4603-A589-7422A47A8E4A}"/>
     </a:ext>
   </a:extLst>
 </a:theme>
@@ -7935,7 +8401,7 @@
     </a:clrScheme>
     <a:fontScheme name="Office">
       <a:majorFont>
-        <a:latin typeface="Calibri Light" panose="020F0302020204030204"/>
+        <a:latin typeface="Calibri Light"/>
         <a:ea typeface=""/>
         <a:cs typeface=""/>
         <a:font script="Jpan" typeface="ＭＳ Ｐゴシック"/>
@@ -7970,7 +8436,7 @@
         <a:font script="Geor" typeface="Sylfaen"/>
       </a:majorFont>
       <a:minorFont>
-        <a:latin typeface="Calibri" panose="020F0502020204030204"/>
+        <a:latin typeface="Calibri"/>
         <a:ea typeface=""/>
         <a:cs typeface=""/>
         <a:font script="Jpan" typeface="ＭＳ Ｐゴシック"/>
@@ -8147,7 +8613,7 @@
   <a:extraClrSchemeLst/>
   <a:extLst>
     <a:ext uri="{05A4C25C-085E-4340-85A3-A5531E510DB2}">
-      <thm15:themeFamily xmlns:thm15="http://schemas.microsoft.com/office/thememl/2012/main" name="Office Theme" id="{62F939B6-93AF-4DB8-9C6B-D6C7DFDC589F}" vid="{4A3C46E8-61CC-4603-A589-7422A47A8E4A}"/>
+      <thm15:themeFamily xmlns:thm15="http://schemas.microsoft.com/office/thememl/2012/main" xmlns="" name="Office Theme" id="{62F939B6-93AF-4DB8-9C6B-D6C7DFDC589F}" vid="{4A3C46E8-61CC-4603-A589-7422A47A8E4A}"/>
     </a:ext>
   </a:extLst>
 </a:theme>

</xml_diff>